<commit_message>
Presentación y código para configurar dbeaver
</commit_message>
<xml_diff>
--- a/02 - Introducción a bases de datos.pptx
+++ b/02 - Introducción a bases de datos.pptx
@@ -5,7 +5,7 @@
     <p:sldMasterId id="2147483648" r:id="rId4"/>
   </p:sldMasterIdLst>
   <p:notesMasterIdLst>
-    <p:notesMasterId r:id="rId29"/>
+    <p:notesMasterId r:id="rId32"/>
   </p:notesMasterIdLst>
   <p:sldIdLst>
     <p:sldId id="256" r:id="rId5"/>
@@ -30,8 +30,11 @@
     <p:sldId id="299" r:id="rId24"/>
     <p:sldId id="300" r:id="rId25"/>
     <p:sldId id="301" r:id="rId26"/>
-    <p:sldId id="258" r:id="rId27"/>
-    <p:sldId id="259" r:id="rId28"/>
+    <p:sldId id="305" r:id="rId27"/>
+    <p:sldId id="304" r:id="rId28"/>
+    <p:sldId id="302" r:id="rId29"/>
+    <p:sldId id="258" r:id="rId30"/>
+    <p:sldId id="259" r:id="rId31"/>
   </p:sldIdLst>
   <p:sldSz cx="12192000" cy="6858000"/>
   <p:notesSz cx="6858000" cy="9144000"/>
@@ -141,8 +144,7 @@
 <file path=ppt/revisionInfo.xml><?xml version="1.0" encoding="utf-8"?>
 <p1510:revInfo xmlns:a="http://schemas.openxmlformats.org/drawingml/2006/main" xmlns:r="http://schemas.openxmlformats.org/officeDocument/2006/relationships" xmlns:p1510="http://schemas.microsoft.com/office/powerpoint/2015/10/main">
   <p1510:revLst>
-    <p1510:client id="{089DB8B5-335D-47A5-BB5B-3C6444941A4A}" v="61" dt="2025-03-05T03:51:22.674"/>
-    <p1510:client id="{662FE975-D15C-471E-B870-AF4199E23690}" v="258" dt="2025-03-05T02:08:45.280"/>
+    <p1510:client id="{089DB8B5-335D-47A5-BB5B-3C6444941A4A}" v="64" dt="2025-03-08T15:44:55.651"/>
   </p1510:revLst>
 </p1510:revInfo>
 </file>
@@ -152,7 +154,7 @@
   <pc:docChgLst>
     <pc:chgData name="Mateo Lopera Cardona" userId="666b5d0666acd5eb" providerId="LiveId" clId="{089DB8B5-335D-47A5-BB5B-3C6444941A4A}"/>
     <pc:docChg chg="undo redo custSel addSld delSld modSld sldOrd">
-      <pc:chgData name="Mateo Lopera Cardona" userId="666b5d0666acd5eb" providerId="LiveId" clId="{089DB8B5-335D-47A5-BB5B-3C6444941A4A}" dt="2025-03-05T04:11:11.177" v="3152" actId="1076"/>
+      <pc:chgData name="Mateo Lopera Cardona" userId="666b5d0666acd5eb" providerId="LiveId" clId="{089DB8B5-335D-47A5-BB5B-3C6444941A4A}" dt="2025-03-08T15:45:43.414" v="3281" actId="20577"/>
       <pc:docMkLst>
         <pc:docMk/>
       </pc:docMkLst>
@@ -220,22 +222,6 @@
           <pc:docMk/>
           <pc:sldMk cId="4115023006" sldId="264"/>
         </pc:sldMkLst>
-        <pc:spChg chg="mod">
-          <ac:chgData name="Mateo Lopera Cardona" userId="666b5d0666acd5eb" providerId="LiveId" clId="{089DB8B5-335D-47A5-BB5B-3C6444941A4A}" dt="2025-03-05T02:39:04.409" v="814" actId="790"/>
-          <ac:spMkLst>
-            <pc:docMk/>
-            <pc:sldMk cId="4115023006" sldId="264"/>
-            <ac:spMk id="2" creationId="{D4CA08FF-7C77-D50B-60AC-432331BC87F4}"/>
-          </ac:spMkLst>
-        </pc:spChg>
-        <pc:spChg chg="mod">
-          <ac:chgData name="Mateo Lopera Cardona" userId="666b5d0666acd5eb" providerId="LiveId" clId="{089DB8B5-335D-47A5-BB5B-3C6444941A4A}" dt="2025-03-05T02:39:04.409" v="814" actId="790"/>
-          <ac:spMkLst>
-            <pc:docMk/>
-            <pc:sldMk cId="4115023006" sldId="264"/>
-            <ac:spMk id="4" creationId="{2DD72DCC-EE59-7AF1-CE80-D851AFB92E85}"/>
-          </ac:spMkLst>
-        </pc:spChg>
       </pc:sldChg>
       <pc:sldChg chg="modSp del mod">
         <pc:chgData name="Mateo Lopera Cardona" userId="666b5d0666acd5eb" providerId="LiveId" clId="{089DB8B5-335D-47A5-BB5B-3C6444941A4A}" dt="2025-03-05T03:23:50.154" v="1609" actId="47"/>
@@ -243,46 +229,6 @@
           <pc:docMk/>
           <pc:sldMk cId="2881193025" sldId="265"/>
         </pc:sldMkLst>
-        <pc:spChg chg="mod">
-          <ac:chgData name="Mateo Lopera Cardona" userId="666b5d0666acd5eb" providerId="LiveId" clId="{089DB8B5-335D-47A5-BB5B-3C6444941A4A}" dt="2025-03-05T02:39:04.409" v="814" actId="790"/>
-          <ac:spMkLst>
-            <pc:docMk/>
-            <pc:sldMk cId="2881193025" sldId="265"/>
-            <ac:spMk id="2" creationId="{BE57AEA3-5F0E-EEE7-30B0-2422446F10BF}"/>
-          </ac:spMkLst>
-        </pc:spChg>
-        <pc:spChg chg="mod">
-          <ac:chgData name="Mateo Lopera Cardona" userId="666b5d0666acd5eb" providerId="LiveId" clId="{089DB8B5-335D-47A5-BB5B-3C6444941A4A}" dt="2025-03-05T02:39:04.409" v="814" actId="790"/>
-          <ac:spMkLst>
-            <pc:docMk/>
-            <pc:sldMk cId="2881193025" sldId="265"/>
-            <ac:spMk id="5" creationId="{91D597B3-FAF3-114C-1DE3-1D3494383919}"/>
-          </ac:spMkLst>
-        </pc:spChg>
-        <pc:spChg chg="mod">
-          <ac:chgData name="Mateo Lopera Cardona" userId="666b5d0666acd5eb" providerId="LiveId" clId="{089DB8B5-335D-47A5-BB5B-3C6444941A4A}" dt="2025-03-05T02:39:04.409" v="814" actId="790"/>
-          <ac:spMkLst>
-            <pc:docMk/>
-            <pc:sldMk cId="2881193025" sldId="265"/>
-            <ac:spMk id="6" creationId="{7BD840AA-596D-1659-F59B-E8849B73CDE4}"/>
-          </ac:spMkLst>
-        </pc:spChg>
-        <pc:spChg chg="mod">
-          <ac:chgData name="Mateo Lopera Cardona" userId="666b5d0666acd5eb" providerId="LiveId" clId="{089DB8B5-335D-47A5-BB5B-3C6444941A4A}" dt="2025-03-05T02:39:04.409" v="814" actId="790"/>
-          <ac:spMkLst>
-            <pc:docMk/>
-            <pc:sldMk cId="2881193025" sldId="265"/>
-            <ac:spMk id="7" creationId="{D4E4C9C7-EEE8-657C-7A20-2DA9F5BE2F21}"/>
-          </ac:spMkLst>
-        </pc:spChg>
-        <pc:spChg chg="mod">
-          <ac:chgData name="Mateo Lopera Cardona" userId="666b5d0666acd5eb" providerId="LiveId" clId="{089DB8B5-335D-47A5-BB5B-3C6444941A4A}" dt="2025-03-05T02:39:04.409" v="814" actId="790"/>
-          <ac:spMkLst>
-            <pc:docMk/>
-            <pc:sldMk cId="2881193025" sldId="265"/>
-            <ac:spMk id="8" creationId="{369C2B28-F8DE-361B-4000-815AF2A59CE0}"/>
-          </ac:spMkLst>
-        </pc:spChg>
       </pc:sldChg>
       <pc:sldChg chg="del">
         <pc:chgData name="Mateo Lopera Cardona" userId="666b5d0666acd5eb" providerId="LiveId" clId="{089DB8B5-335D-47A5-BB5B-3C6444941A4A}" dt="2025-03-05T02:12:26.181" v="4" actId="47"/>
@@ -297,14 +243,6 @@
           <pc:docMk/>
           <pc:sldMk cId="3513595121" sldId="267"/>
         </pc:sldMkLst>
-        <pc:spChg chg="mod">
-          <ac:chgData name="Mateo Lopera Cardona" userId="666b5d0666acd5eb" providerId="LiveId" clId="{089DB8B5-335D-47A5-BB5B-3C6444941A4A}" dt="2025-03-05T02:39:04.409" v="814" actId="790"/>
-          <ac:spMkLst>
-            <pc:docMk/>
-            <pc:sldMk cId="3513595121" sldId="267"/>
-            <ac:spMk id="2" creationId="{41E697A3-A048-222A-BE88-134BC7B93003}"/>
-          </ac:spMkLst>
-        </pc:spChg>
       </pc:sldChg>
       <pc:sldChg chg="del">
         <pc:chgData name="Mateo Lopera Cardona" userId="666b5d0666acd5eb" providerId="LiveId" clId="{089DB8B5-335D-47A5-BB5B-3C6444941A4A}" dt="2025-03-05T02:12:38.946" v="5" actId="47"/>
@@ -405,22 +343,6 @@
           <pc:docMk/>
           <pc:sldMk cId="359111251" sldId="279"/>
         </pc:sldMkLst>
-        <pc:spChg chg="mod">
-          <ac:chgData name="Mateo Lopera Cardona" userId="666b5d0666acd5eb" providerId="LiveId" clId="{089DB8B5-335D-47A5-BB5B-3C6444941A4A}" dt="2025-03-05T02:39:04.409" v="814" actId="790"/>
-          <ac:spMkLst>
-            <pc:docMk/>
-            <pc:sldMk cId="359111251" sldId="279"/>
-            <ac:spMk id="2" creationId="{B6E22FA5-6B7F-83BE-769D-E9C8C1777C48}"/>
-          </ac:spMkLst>
-        </pc:spChg>
-        <pc:spChg chg="mod">
-          <ac:chgData name="Mateo Lopera Cardona" userId="666b5d0666acd5eb" providerId="LiveId" clId="{089DB8B5-335D-47A5-BB5B-3C6444941A4A}" dt="2025-03-05T02:44:06.227" v="916" actId="20577"/>
-          <ac:spMkLst>
-            <pc:docMk/>
-            <pc:sldMk cId="359111251" sldId="279"/>
-            <ac:spMk id="3" creationId="{5B9B6499-01C9-10C1-993E-79A14BC770C9}"/>
-          </ac:spMkLst>
-        </pc:spChg>
       </pc:sldChg>
       <pc:sldChg chg="del">
         <pc:chgData name="Mateo Lopera Cardona" userId="666b5d0666acd5eb" providerId="LiveId" clId="{089DB8B5-335D-47A5-BB5B-3C6444941A4A}" dt="2025-03-05T02:12:50.357" v="6" actId="47"/>
@@ -463,14 +385,6 @@
             <pc:docMk/>
             <pc:sldMk cId="2974677494" sldId="282"/>
             <ac:spMk id="3" creationId="{D68B3BDC-DC9B-44F2-8CAD-52BC0D00F752}"/>
-          </ac:spMkLst>
-        </pc:spChg>
-        <pc:spChg chg="add del mod">
-          <ac:chgData name="Mateo Lopera Cardona" userId="666b5d0666acd5eb" providerId="LiveId" clId="{089DB8B5-335D-47A5-BB5B-3C6444941A4A}" dt="2025-03-05T03:03:28.929" v="1018" actId="478"/>
-          <ac:spMkLst>
-            <pc:docMk/>
-            <pc:sldMk cId="2974677494" sldId="282"/>
-            <ac:spMk id="4" creationId="{5FEE57E8-C370-2900-06AA-2B2C5D75BEFB}"/>
           </ac:spMkLst>
         </pc:spChg>
       </pc:sldChg>
@@ -541,22 +455,6 @@
             <ac:spMk id="2" creationId="{22352BEE-D904-6FC0-A263-7170BC75F8C8}"/>
           </ac:spMkLst>
         </pc:spChg>
-        <pc:spChg chg="del">
-          <ac:chgData name="Mateo Lopera Cardona" userId="666b5d0666acd5eb" providerId="LiveId" clId="{089DB8B5-335D-47A5-BB5B-3C6444941A4A}" dt="2025-03-05T02:24:59.426" v="263" actId="478"/>
-          <ac:spMkLst>
-            <pc:docMk/>
-            <pc:sldMk cId="2382820545" sldId="284"/>
-            <ac:spMk id="3" creationId="{CD9B81A1-E961-9603-66EE-AE11BB810386}"/>
-          </ac:spMkLst>
-        </pc:spChg>
-        <pc:spChg chg="del">
-          <ac:chgData name="Mateo Lopera Cardona" userId="666b5d0666acd5eb" providerId="LiveId" clId="{089DB8B5-335D-47A5-BB5B-3C6444941A4A}" dt="2025-03-05T02:25:03.406" v="265" actId="478"/>
-          <ac:spMkLst>
-            <pc:docMk/>
-            <pc:sldMk cId="2382820545" sldId="284"/>
-            <ac:spMk id="4" creationId="{B537E8B2-CBD4-44FC-FE58-D66C23372833}"/>
-          </ac:spMkLst>
-        </pc:spChg>
         <pc:spChg chg="add mod">
           <ac:chgData name="Mateo Lopera Cardona" userId="666b5d0666acd5eb" providerId="LiveId" clId="{089DB8B5-335D-47A5-BB5B-3C6444941A4A}" dt="2025-03-05T02:56:43.055" v="940" actId="20577"/>
           <ac:spMkLst>
@@ -565,14 +463,6 @@
             <ac:spMk id="5" creationId="{84CC445C-1DB8-255B-00AE-3B427C338ED4}"/>
           </ac:spMkLst>
         </pc:spChg>
-        <pc:picChg chg="del">
-          <ac:chgData name="Mateo Lopera Cardona" userId="666b5d0666acd5eb" providerId="LiveId" clId="{089DB8B5-335D-47A5-BB5B-3C6444941A4A}" dt="2025-03-05T02:25:00.362" v="264" actId="478"/>
-          <ac:picMkLst>
-            <pc:docMk/>
-            <pc:sldMk cId="2382820545" sldId="284"/>
-            <ac:picMk id="6" creationId="{616F766A-1966-85B7-459A-1690E724AE82}"/>
-          </ac:picMkLst>
-        </pc:picChg>
       </pc:sldChg>
       <pc:sldChg chg="addSp modSp add mod">
         <pc:chgData name="Mateo Lopera Cardona" userId="666b5d0666acd5eb" providerId="LiveId" clId="{089DB8B5-335D-47A5-BB5B-3C6444941A4A}" dt="2025-03-05T02:39:04.409" v="814" actId="790"/>
@@ -634,22 +524,6 @@
             <ac:spMk id="3" creationId="{AB33731D-AB86-6C95-3678-3424945D02D7}"/>
           </ac:spMkLst>
         </pc:spChg>
-        <pc:spChg chg="del">
-          <ac:chgData name="Mateo Lopera Cardona" userId="666b5d0666acd5eb" providerId="LiveId" clId="{089DB8B5-335D-47A5-BB5B-3C6444941A4A}" dt="2025-03-05T02:42:13.622" v="892" actId="478"/>
-          <ac:spMkLst>
-            <pc:docMk/>
-            <pc:sldMk cId="1141265541" sldId="286"/>
-            <ac:spMk id="4" creationId="{371071A3-7FDF-C1F9-10BA-B3F66A8DDA43}"/>
-          </ac:spMkLst>
-        </pc:spChg>
-        <pc:picChg chg="del">
-          <ac:chgData name="Mateo Lopera Cardona" userId="666b5d0666acd5eb" providerId="LiveId" clId="{089DB8B5-335D-47A5-BB5B-3C6444941A4A}" dt="2025-03-05T02:42:16.309" v="893" actId="478"/>
-          <ac:picMkLst>
-            <pc:docMk/>
-            <pc:sldMk cId="1141265541" sldId="286"/>
-            <ac:picMk id="6" creationId="{288AC395-520C-64D4-4609-D8A5123BC34B}"/>
-          </ac:picMkLst>
-        </pc:picChg>
       </pc:sldChg>
       <pc:sldChg chg="add del">
         <pc:chgData name="Mateo Lopera Cardona" userId="666b5d0666acd5eb" providerId="LiveId" clId="{089DB8B5-335D-47A5-BB5B-3C6444941A4A}" dt="2025-03-05T02:40:14.759" v="834"/>
@@ -659,7 +533,7 @@
         </pc:sldMkLst>
       </pc:sldChg>
       <pc:sldChg chg="addSp delSp modSp add mod">
-        <pc:chgData name="Mateo Lopera Cardona" userId="666b5d0666acd5eb" providerId="LiveId" clId="{089DB8B5-335D-47A5-BB5B-3C6444941A4A}" dt="2025-03-05T02:59:31.753" v="987" actId="1076"/>
+        <pc:chgData name="Mateo Lopera Cardona" userId="666b5d0666acd5eb" providerId="LiveId" clId="{089DB8B5-335D-47A5-BB5B-3C6444941A4A}" dt="2025-03-08T00:43:58.229" v="3154" actId="20577"/>
         <pc:sldMkLst>
           <pc:docMk/>
           <pc:sldMk cId="3630383900" sldId="287"/>
@@ -672,16 +546,8 @@
             <ac:spMk id="2" creationId="{4CD70C8C-30E9-39BC-DFF6-115DC9250DF9}"/>
           </ac:spMkLst>
         </pc:spChg>
-        <pc:spChg chg="add del mod">
-          <ac:chgData name="Mateo Lopera Cardona" userId="666b5d0666acd5eb" providerId="LiveId" clId="{089DB8B5-335D-47A5-BB5B-3C6444941A4A}" dt="2025-03-05T02:59:15.396" v="981" actId="478"/>
-          <ac:spMkLst>
-            <pc:docMk/>
-            <pc:sldMk cId="3630383900" sldId="287"/>
-            <ac:spMk id="3" creationId="{651475DF-A18B-B560-9F9F-28A9DAA507E4}"/>
-          </ac:spMkLst>
-        </pc:spChg>
         <pc:spChg chg="mod">
-          <ac:chgData name="Mateo Lopera Cardona" userId="666b5d0666acd5eb" providerId="LiveId" clId="{089DB8B5-335D-47A5-BB5B-3C6444941A4A}" dt="2025-03-05T02:59:31.753" v="987" actId="1076"/>
+          <ac:chgData name="Mateo Lopera Cardona" userId="666b5d0666acd5eb" providerId="LiveId" clId="{089DB8B5-335D-47A5-BB5B-3C6444941A4A}" dt="2025-03-08T00:43:58.229" v="3154" actId="20577"/>
           <ac:spMkLst>
             <pc:docMk/>
             <pc:sldMk cId="3630383900" sldId="287"/>
@@ -833,14 +699,6 @@
           <pc:docMk/>
           <pc:sldMk cId="1964970075" sldId="294"/>
         </pc:sldMkLst>
-        <pc:spChg chg="mod">
-          <ac:chgData name="Mateo Lopera Cardona" userId="666b5d0666acd5eb" providerId="LiveId" clId="{089DB8B5-335D-47A5-BB5B-3C6444941A4A}" dt="2025-03-05T03:24:14.987" v="1634" actId="20577"/>
-          <ac:spMkLst>
-            <pc:docMk/>
-            <pc:sldMk cId="1964970075" sldId="294"/>
-            <ac:spMk id="2" creationId="{1BD9555A-2E44-A1D2-A334-6D51B3E9ECB7}"/>
-          </ac:spMkLst>
-        </pc:spChg>
       </pc:sldChg>
       <pc:sldChg chg="addSp delSp modSp add mod">
         <pc:chgData name="Mateo Lopera Cardona" userId="666b5d0666acd5eb" providerId="LiveId" clId="{089DB8B5-335D-47A5-BB5B-3C6444941A4A}" dt="2025-03-05T03:31:04.415" v="1790" actId="20577"/>
@@ -864,14 +722,6 @@
             <ac:spMk id="4" creationId="{06FC2B3B-6E03-C6D0-BCA0-47B87F6D388F}"/>
           </ac:spMkLst>
         </pc:spChg>
-        <pc:picChg chg="add del mod">
-          <ac:chgData name="Mateo Lopera Cardona" userId="666b5d0666acd5eb" providerId="LiveId" clId="{089DB8B5-335D-47A5-BB5B-3C6444941A4A}" dt="2025-03-05T03:28:24.580" v="1701" actId="478"/>
-          <ac:picMkLst>
-            <pc:docMk/>
-            <pc:sldMk cId="2851296173" sldId="294"/>
-            <ac:picMk id="3" creationId="{BEEDC908-8137-A44B-E20F-642E8AF54001}"/>
-          </ac:picMkLst>
-        </pc:picChg>
         <pc:picChg chg="mod">
           <ac:chgData name="Mateo Lopera Cardona" userId="666b5d0666acd5eb" providerId="LiveId" clId="{089DB8B5-335D-47A5-BB5B-3C6444941A4A}" dt="2025-03-05T03:27:35.417" v="1694" actId="1076"/>
           <ac:picMkLst>
@@ -910,22 +760,6 @@
             <ac:spMk id="5" creationId="{07E1296B-645D-D9E9-90E7-E553CC268D5C}"/>
           </ac:spMkLst>
         </pc:spChg>
-        <pc:picChg chg="add del mod">
-          <ac:chgData name="Mateo Lopera Cardona" userId="666b5d0666acd5eb" providerId="LiveId" clId="{089DB8B5-335D-47A5-BB5B-3C6444941A4A}" dt="2025-03-05T03:28:53.527" v="1706" actId="478"/>
-          <ac:picMkLst>
-            <pc:docMk/>
-            <pc:sldMk cId="2838040135" sldId="295"/>
-            <ac:picMk id="3" creationId="{0427D62C-010B-D778-651F-F9A3EFE2E410}"/>
-          </ac:picMkLst>
-        </pc:picChg>
-        <pc:picChg chg="add del mod">
-          <ac:chgData name="Mateo Lopera Cardona" userId="666b5d0666acd5eb" providerId="LiveId" clId="{089DB8B5-335D-47A5-BB5B-3C6444941A4A}" dt="2025-03-05T03:28:59.667" v="1708" actId="478"/>
-          <ac:picMkLst>
-            <pc:docMk/>
-            <pc:sldMk cId="2838040135" sldId="295"/>
-            <ac:picMk id="4" creationId="{D295B887-07D7-AC06-B43C-033F6F365EBF}"/>
-          </ac:picMkLst>
-        </pc:picChg>
         <pc:picChg chg="mod">
           <ac:chgData name="Mateo Lopera Cardona" userId="666b5d0666acd5eb" providerId="LiveId" clId="{089DB8B5-335D-47A5-BB5B-3C6444941A4A}" dt="2025-03-05T03:28:50.778" v="1705" actId="1076"/>
           <ac:picMkLst>
@@ -957,14 +791,6 @@
             <ac:spMk id="4" creationId="{22EFC348-82BA-7568-A439-2AB46C0746D7}"/>
           </ac:spMkLst>
         </pc:spChg>
-        <pc:picChg chg="add del mod">
-          <ac:chgData name="Mateo Lopera Cardona" userId="666b5d0666acd5eb" providerId="LiveId" clId="{089DB8B5-335D-47A5-BB5B-3C6444941A4A}" dt="2025-03-05T03:29:36.911" v="1713" actId="478"/>
-          <ac:picMkLst>
-            <pc:docMk/>
-            <pc:sldMk cId="2113465856" sldId="296"/>
-            <ac:picMk id="3" creationId="{A76F4386-36FF-4BBE-CEFC-5A3D5496A487}"/>
-          </ac:picMkLst>
-        </pc:picChg>
         <pc:picChg chg="mod">
           <ac:chgData name="Mateo Lopera Cardona" userId="666b5d0666acd5eb" providerId="LiveId" clId="{089DB8B5-335D-47A5-BB5B-3C6444941A4A}" dt="2025-03-05T03:29:35.036" v="1712" actId="1076"/>
           <ac:picMkLst>
@@ -1027,14 +853,6 @@
             <ac:spMk id="5" creationId="{A340DC6E-3D0A-5555-F2DE-94BD2EEFB9DB}"/>
           </ac:spMkLst>
         </pc:spChg>
-        <pc:spChg chg="add del">
-          <ac:chgData name="Mateo Lopera Cardona" userId="666b5d0666acd5eb" providerId="LiveId" clId="{089DB8B5-335D-47A5-BB5B-3C6444941A4A}" dt="2025-03-05T03:41:42.792" v="2407" actId="22"/>
-          <ac:spMkLst>
-            <pc:docMk/>
-            <pc:sldMk cId="265269565" sldId="298"/>
-            <ac:spMk id="6" creationId="{88491BA2-8075-06E8-89F5-3BDF9FAA2C6C}"/>
-          </ac:spMkLst>
-        </pc:spChg>
       </pc:sldChg>
       <pc:sldChg chg="addSp delSp modSp add mod">
         <pc:chgData name="Mateo Lopera Cardona" userId="666b5d0666acd5eb" providerId="LiveId" clId="{089DB8B5-335D-47A5-BB5B-3C6444941A4A}" dt="2025-03-05T03:49:22.509" v="3066" actId="1036"/>
@@ -1056,14 +874,6 @@
             <pc:docMk/>
             <pc:sldMk cId="2186460106" sldId="299"/>
             <ac:spMk id="5" creationId="{8D9A8635-1940-32EA-8EB7-E98C63D232D1}"/>
-          </ac:spMkLst>
-        </pc:spChg>
-        <pc:spChg chg="add del">
-          <ac:chgData name="Mateo Lopera Cardona" userId="666b5d0666acd5eb" providerId="LiveId" clId="{089DB8B5-335D-47A5-BB5B-3C6444941A4A}" dt="2025-03-05T03:46:58.085" v="2861" actId="22"/>
-          <ac:spMkLst>
-            <pc:docMk/>
-            <pc:sldMk cId="2186460106" sldId="299"/>
-            <ac:spMk id="6" creationId="{E1A4DB81-67B3-0D3F-8119-3B983258C78E}"/>
           </ac:spMkLst>
         </pc:spChg>
       </pc:sldChg>
@@ -1091,7 +901,7 @@
         </pc:spChg>
       </pc:sldChg>
       <pc:sldChg chg="addSp delSp modSp add mod">
-        <pc:chgData name="Mateo Lopera Cardona" userId="666b5d0666acd5eb" providerId="LiveId" clId="{089DB8B5-335D-47A5-BB5B-3C6444941A4A}" dt="2025-03-05T04:11:11.177" v="3152" actId="1076"/>
+        <pc:chgData name="Mateo Lopera Cardona" userId="666b5d0666acd5eb" providerId="LiveId" clId="{089DB8B5-335D-47A5-BB5B-3C6444941A4A}" dt="2025-03-08T13:03:51.812" v="3247" actId="1076"/>
         <pc:sldMkLst>
           <pc:docMk/>
           <pc:sldMk cId="4109638691" sldId="301"/>
@@ -1104,38 +914,106 @@
             <ac:spMk id="2" creationId="{30829619-0C69-24DA-C95E-509DD330A52D}"/>
           </ac:spMkLst>
         </pc:spChg>
-        <pc:spChg chg="del">
-          <ac:chgData name="Mateo Lopera Cardona" userId="666b5d0666acd5eb" providerId="LiveId" clId="{089DB8B5-335D-47A5-BB5B-3C6444941A4A}" dt="2025-03-05T03:51:26.134" v="3145" actId="478"/>
-          <ac:spMkLst>
-            <pc:docMk/>
-            <pc:sldMk cId="4109638691" sldId="301"/>
-            <ac:spMk id="4" creationId="{4B28665B-A9E3-4AE5-4866-AE35F083A78C}"/>
-          </ac:spMkLst>
-        </pc:spChg>
-        <pc:spChg chg="add del">
-          <ac:chgData name="Mateo Lopera Cardona" userId="666b5d0666acd5eb" providerId="LiveId" clId="{089DB8B5-335D-47A5-BB5B-3C6444941A4A}" dt="2025-03-05T04:10:12.054" v="3147" actId="22"/>
-          <ac:spMkLst>
-            <pc:docMk/>
-            <pc:sldMk cId="4109638691" sldId="301"/>
-            <ac:spMk id="5" creationId="{93D38734-7220-464C-B8AE-D4DC14BED634}"/>
-          </ac:spMkLst>
-        </pc:spChg>
         <pc:spChg chg="add mod">
-          <ac:chgData name="Mateo Lopera Cardona" userId="666b5d0666acd5eb" providerId="LiveId" clId="{089DB8B5-335D-47A5-BB5B-3C6444941A4A}" dt="2025-03-05T04:11:11.177" v="3152" actId="1076"/>
+          <ac:chgData name="Mateo Lopera Cardona" userId="666b5d0666acd5eb" providerId="LiveId" clId="{089DB8B5-335D-47A5-BB5B-3C6444941A4A}" dt="2025-03-08T13:03:51.812" v="3247" actId="1076"/>
           <ac:spMkLst>
             <pc:docMk/>
             <pc:sldMk cId="4109638691" sldId="301"/>
             <ac:spMk id="7" creationId="{EB99F8D5-A4E1-5A67-82DA-65A0B0DEF997}"/>
           </ac:spMkLst>
         </pc:spChg>
-        <pc:picChg chg="del">
-          <ac:chgData name="Mateo Lopera Cardona" userId="666b5d0666acd5eb" providerId="LiveId" clId="{089DB8B5-335D-47A5-BB5B-3C6444941A4A}" dt="2025-03-05T03:51:22.674" v="3144" actId="478"/>
-          <ac:picMkLst>
+      </pc:sldChg>
+      <pc:sldChg chg="addSp delSp modSp add mod">
+        <pc:chgData name="Mateo Lopera Cardona" userId="666b5d0666acd5eb" providerId="LiveId" clId="{089DB8B5-335D-47A5-BB5B-3C6444941A4A}" dt="2025-03-08T15:39:52.497" v="3262"/>
+        <pc:sldMkLst>
+          <pc:docMk/>
+          <pc:sldMk cId="583016310" sldId="302"/>
+        </pc:sldMkLst>
+        <pc:spChg chg="mod">
+          <ac:chgData name="Mateo Lopera Cardona" userId="666b5d0666acd5eb" providerId="LiveId" clId="{089DB8B5-335D-47A5-BB5B-3C6444941A4A}" dt="2025-03-08T12:55:58.718" v="3185" actId="20577"/>
+          <ac:spMkLst>
             <pc:docMk/>
-            <pc:sldMk cId="4109638691" sldId="301"/>
-            <ac:picMk id="4098" creationId="{497BCFCC-D61B-EF84-39C2-1DE1C1F25D15}"/>
-          </ac:picMkLst>
-        </pc:picChg>
+            <pc:sldMk cId="583016310" sldId="302"/>
+            <ac:spMk id="2" creationId="{345917B1-16AC-9C8A-D256-6F2B35B9E256}"/>
+          </ac:spMkLst>
+        </pc:spChg>
+        <pc:spChg chg="add mod">
+          <ac:chgData name="Mateo Lopera Cardona" userId="666b5d0666acd5eb" providerId="LiveId" clId="{089DB8B5-335D-47A5-BB5B-3C6444941A4A}" dt="2025-03-08T15:39:52.497" v="3262"/>
+          <ac:spMkLst>
+            <pc:docMk/>
+            <pc:sldMk cId="583016310" sldId="302"/>
+            <ac:spMk id="3" creationId="{3EE7E0D7-5720-6638-F1F5-72C0F080DC2C}"/>
+          </ac:spMkLst>
+        </pc:spChg>
+        <pc:spChg chg="del mod">
+          <ac:chgData name="Mateo Lopera Cardona" userId="666b5d0666acd5eb" providerId="LiveId" clId="{089DB8B5-335D-47A5-BB5B-3C6444941A4A}" dt="2025-03-08T13:04:00.183" v="3248" actId="478"/>
+          <ac:spMkLst>
+            <pc:docMk/>
+            <pc:sldMk cId="583016310" sldId="302"/>
+            <ac:spMk id="7" creationId="{856A1698-7C99-C6E2-6721-6822343E8C7F}"/>
+          </ac:spMkLst>
+        </pc:spChg>
+      </pc:sldChg>
+      <pc:sldChg chg="delSp modSp new del mod">
+        <pc:chgData name="Mateo Lopera Cardona" userId="666b5d0666acd5eb" providerId="LiveId" clId="{089DB8B5-335D-47A5-BB5B-3C6444941A4A}" dt="2025-03-08T15:44:41.094" v="3263" actId="47"/>
+        <pc:sldMkLst>
+          <pc:docMk/>
+          <pc:sldMk cId="3378413433" sldId="303"/>
+        </pc:sldMkLst>
+        <pc:spChg chg="del">
+          <ac:chgData name="Mateo Lopera Cardona" userId="666b5d0666acd5eb" providerId="LiveId" clId="{089DB8B5-335D-47A5-BB5B-3C6444941A4A}" dt="2025-03-08T14:21:03.875" v="3259" actId="478"/>
+          <ac:spMkLst>
+            <pc:docMk/>
+            <pc:sldMk cId="3378413433" sldId="303"/>
+            <ac:spMk id="2" creationId="{330B8721-F7BE-0CC8-A0F8-8DBE6E41CA8C}"/>
+          </ac:spMkLst>
+        </pc:spChg>
+        <pc:spChg chg="mod">
+          <ac:chgData name="Mateo Lopera Cardona" userId="666b5d0666acd5eb" providerId="LiveId" clId="{089DB8B5-335D-47A5-BB5B-3C6444941A4A}" dt="2025-03-08T14:21:00.441" v="3258"/>
+          <ac:spMkLst>
+            <pc:docMk/>
+            <pc:sldMk cId="3378413433" sldId="303"/>
+            <ac:spMk id="3" creationId="{79815522-F432-13FF-B450-08C76329E10C}"/>
+          </ac:spMkLst>
+        </pc:spChg>
+      </pc:sldChg>
+      <pc:sldChg chg="modSp new mod">
+        <pc:chgData name="Mateo Lopera Cardona" userId="666b5d0666acd5eb" providerId="LiveId" clId="{089DB8B5-335D-47A5-BB5B-3C6444941A4A}" dt="2025-03-08T15:36:43.319" v="3261"/>
+        <pc:sldMkLst>
+          <pc:docMk/>
+          <pc:sldMk cId="3640573840" sldId="304"/>
+        </pc:sldMkLst>
+        <pc:spChg chg="mod">
+          <ac:chgData name="Mateo Lopera Cardona" userId="666b5d0666acd5eb" providerId="LiveId" clId="{089DB8B5-335D-47A5-BB5B-3C6444941A4A}" dt="2025-03-08T15:36:43.319" v="3261"/>
+          <ac:spMkLst>
+            <pc:docMk/>
+            <pc:sldMk cId="3640573840" sldId="304"/>
+            <ac:spMk id="3" creationId="{A79AC125-C7EC-93D3-5053-897C1B7E03BE}"/>
+          </ac:spMkLst>
+        </pc:spChg>
+      </pc:sldChg>
+      <pc:sldChg chg="modSp add mod">
+        <pc:chgData name="Mateo Lopera Cardona" userId="666b5d0666acd5eb" providerId="LiveId" clId="{089DB8B5-335D-47A5-BB5B-3C6444941A4A}" dt="2025-03-08T15:45:43.414" v="3281" actId="20577"/>
+        <pc:sldMkLst>
+          <pc:docMk/>
+          <pc:sldMk cId="1877543194" sldId="305"/>
+        </pc:sldMkLst>
+        <pc:spChg chg="mod">
+          <ac:chgData name="Mateo Lopera Cardona" userId="666b5d0666acd5eb" providerId="LiveId" clId="{089DB8B5-335D-47A5-BB5B-3C6444941A4A}" dt="2025-03-08T15:45:01.642" v="3276" actId="20577"/>
+          <ac:spMkLst>
+            <pc:docMk/>
+            <pc:sldMk cId="1877543194" sldId="305"/>
+            <ac:spMk id="2" creationId="{DD79243C-F378-19FA-E4B6-4A255AD3FC7F}"/>
+          </ac:spMkLst>
+        </pc:spChg>
+        <pc:spChg chg="mod">
+          <ac:chgData name="Mateo Lopera Cardona" userId="666b5d0666acd5eb" providerId="LiveId" clId="{089DB8B5-335D-47A5-BB5B-3C6444941A4A}" dt="2025-03-08T15:45:43.414" v="3281" actId="20577"/>
+          <ac:spMkLst>
+            <pc:docMk/>
+            <pc:sldMk cId="1877543194" sldId="305"/>
+            <ac:spMk id="7" creationId="{F3F3221F-CFD6-29E3-02BC-C99551B36701}"/>
+          </ac:spMkLst>
+        </pc:spChg>
       </pc:sldChg>
     </pc:docChg>
   </pc:docChgLst>
@@ -1438,14 +1316,6 @@
           <pc:docMk/>
           <pc:sldMk cId="2712732833" sldId="286"/>
         </pc:sldMkLst>
-        <pc:spChg chg="mod">
-          <ac:chgData name="Mateo Lopera Cardona" userId="666b5d0666acd5eb" providerId="LiveId" clId="{662FE975-D15C-471E-B870-AF4199E23690}" dt="2025-03-05T02:08:42.949" v="3926" actId="5793"/>
-          <ac:spMkLst>
-            <pc:docMk/>
-            <pc:sldMk cId="2712732833" sldId="286"/>
-            <ac:spMk id="3" creationId="{A8148F7C-9894-5492-9569-649D6D0B183E}"/>
-          </ac:spMkLst>
-        </pc:spChg>
       </pc:sldChg>
     </pc:docChg>
   </pc:docChgLst>
@@ -1534,7 +1404,7 @@
           <a:p>
             <a:fld id="{16264C45-124D-4D95-82C0-9D4888E41BF5}" type="datetimeFigureOut">
               <a:rPr lang="es-CO" smtClean="0"/>
-              <a:t>4/03/2025</a:t>
+              <a:t>7/03/2025</a:t>
             </a:fld>
             <a:endParaRPr lang="es-CO"/>
           </a:p>
@@ -1951,7 +1821,7 @@
           <a:p>
             <a:fld id="{BD74E281-D4A3-454A-BC44-9E620AD75DC4}" type="datetimeFigureOut">
               <a:rPr lang="es-CO" smtClean="0"/>
-              <a:t>4/03/2025</a:t>
+              <a:t>7/03/2025</a:t>
             </a:fld>
             <a:endParaRPr lang="es-CO"/>
           </a:p>
@@ -2151,7 +2021,7 @@
           <a:p>
             <a:fld id="{BD74E281-D4A3-454A-BC44-9E620AD75DC4}" type="datetimeFigureOut">
               <a:rPr lang="es-CO" smtClean="0"/>
-              <a:t>4/03/2025</a:t>
+              <a:t>7/03/2025</a:t>
             </a:fld>
             <a:endParaRPr lang="es-CO"/>
           </a:p>
@@ -2361,7 +2231,7 @@
           <a:p>
             <a:fld id="{BD74E281-D4A3-454A-BC44-9E620AD75DC4}" type="datetimeFigureOut">
               <a:rPr lang="es-CO" smtClean="0"/>
-              <a:t>4/03/2025</a:t>
+              <a:t>7/03/2025</a:t>
             </a:fld>
             <a:endParaRPr lang="es-CO"/>
           </a:p>
@@ -2561,7 +2431,7 @@
           <a:p>
             <a:fld id="{BD74E281-D4A3-454A-BC44-9E620AD75DC4}" type="datetimeFigureOut">
               <a:rPr lang="es-CO" smtClean="0"/>
-              <a:t>4/03/2025</a:t>
+              <a:t>7/03/2025</a:t>
             </a:fld>
             <a:endParaRPr lang="es-CO"/>
           </a:p>
@@ -2837,7 +2707,7 @@
           <a:p>
             <a:fld id="{BD74E281-D4A3-454A-BC44-9E620AD75DC4}" type="datetimeFigureOut">
               <a:rPr lang="es-CO" smtClean="0"/>
-              <a:t>4/03/2025</a:t>
+              <a:t>7/03/2025</a:t>
             </a:fld>
             <a:endParaRPr lang="es-CO"/>
           </a:p>
@@ -3105,7 +2975,7 @@
           <a:p>
             <a:fld id="{BD74E281-D4A3-454A-BC44-9E620AD75DC4}" type="datetimeFigureOut">
               <a:rPr lang="es-CO" smtClean="0"/>
-              <a:t>4/03/2025</a:t>
+              <a:t>7/03/2025</a:t>
             </a:fld>
             <a:endParaRPr lang="es-CO"/>
           </a:p>
@@ -3520,7 +3390,7 @@
           <a:p>
             <a:fld id="{BD74E281-D4A3-454A-BC44-9E620AD75DC4}" type="datetimeFigureOut">
               <a:rPr lang="es-CO" smtClean="0"/>
-              <a:t>4/03/2025</a:t>
+              <a:t>7/03/2025</a:t>
             </a:fld>
             <a:endParaRPr lang="es-CO"/>
           </a:p>
@@ -3662,7 +3532,7 @@
           <a:p>
             <a:fld id="{BD74E281-D4A3-454A-BC44-9E620AD75DC4}" type="datetimeFigureOut">
               <a:rPr lang="es-CO" smtClean="0"/>
-              <a:t>4/03/2025</a:t>
+              <a:t>7/03/2025</a:t>
             </a:fld>
             <a:endParaRPr lang="es-CO"/>
           </a:p>
@@ -3775,7 +3645,7 @@
           <a:p>
             <a:fld id="{BD74E281-D4A3-454A-BC44-9E620AD75DC4}" type="datetimeFigureOut">
               <a:rPr lang="es-CO" smtClean="0"/>
-              <a:t>4/03/2025</a:t>
+              <a:t>7/03/2025</a:t>
             </a:fld>
             <a:endParaRPr lang="es-CO"/>
           </a:p>
@@ -4088,7 +3958,7 @@
           <a:p>
             <a:fld id="{BD74E281-D4A3-454A-BC44-9E620AD75DC4}" type="datetimeFigureOut">
               <a:rPr lang="es-CO" smtClean="0"/>
-              <a:t>4/03/2025</a:t>
+              <a:t>7/03/2025</a:t>
             </a:fld>
             <a:endParaRPr lang="es-CO"/>
           </a:p>
@@ -4377,7 +4247,7 @@
           <a:p>
             <a:fld id="{BD74E281-D4A3-454A-BC44-9E620AD75DC4}" type="datetimeFigureOut">
               <a:rPr lang="es-CO" smtClean="0"/>
-              <a:t>4/03/2025</a:t>
+              <a:t>7/03/2025</a:t>
             </a:fld>
             <a:endParaRPr lang="es-CO"/>
           </a:p>
@@ -4629,7 +4499,7 @@
           <a:p>
             <a:fld id="{BD74E281-D4A3-454A-BC44-9E620AD75DC4}" type="datetimeFigureOut">
               <a:rPr lang="es-CO" smtClean="0"/>
-              <a:t>4/03/2025</a:t>
+              <a:t>7/03/2025</a:t>
             </a:fld>
             <a:endParaRPr lang="es-CO"/>
           </a:p>
@@ -9659,8 +9529,8 @@
         </p:nvSpPr>
         <p:spPr>
           <a:xfrm>
-            <a:off x="3580707" y="2090172"/>
-            <a:ext cx="5030585" cy="2677656"/>
+            <a:off x="2026920" y="1744732"/>
+            <a:ext cx="8138160" cy="2862322"/>
           </a:xfrm>
           <a:prstGeom prst="rect">
             <a:avLst/>
@@ -9674,53 +9544,15 @@
           <a:lstStyle/>
           <a:p>
             <a:r>
-              <a:rPr lang="es-CO" sz="2800" dirty="0">
-                <a:solidFill>
-                  <a:srgbClr val="0000FF"/>
-                </a:solidFill>
-                <a:latin typeface="Consolas" panose="020B0609020204030204" pitchFamily="49" charset="0"/>
-              </a:rPr>
-              <a:t>SELECT</a:t>
-            </a:r>
-            <a:r>
-              <a:rPr lang="es-CO" sz="2800" dirty="0">
-                <a:solidFill>
-                  <a:srgbClr val="000000"/>
-                </a:solidFill>
-                <a:latin typeface="Consolas" panose="020B0609020204030204" pitchFamily="49" charset="0"/>
-              </a:rPr>
-              <a:t> titulo</a:t>
-            </a:r>
-          </a:p>
-          <a:p>
-            <a:r>
-              <a:rPr lang="es-CO" sz="2800" dirty="0">
-                <a:solidFill>
-                  <a:srgbClr val="0000FF"/>
-                </a:solidFill>
-                <a:latin typeface="Consolas" panose="020B0609020204030204" pitchFamily="49" charset="0"/>
-              </a:rPr>
-              <a:t>FROM</a:t>
-            </a:r>
-            <a:r>
-              <a:rPr lang="es-CO" sz="2800" dirty="0">
-                <a:solidFill>
-                  <a:srgbClr val="000000"/>
-                </a:solidFill>
-                <a:latin typeface="Consolas" panose="020B0609020204030204" pitchFamily="49" charset="0"/>
-              </a:rPr>
-              <a:t> </a:t>
-            </a:r>
-            <a:r>
-              <a:rPr lang="es-CO" sz="2800" dirty="0" err="1">
-                <a:solidFill>
-                  <a:srgbClr val="000000"/>
-                </a:solidFill>
-                <a:latin typeface="Consolas" panose="020B0609020204030204" pitchFamily="49" charset="0"/>
-              </a:rPr>
-              <a:t>Cancion</a:t>
-            </a:r>
-            <a:endParaRPr lang="es-CO" sz="2800" dirty="0">
+              <a:rPr lang="es-CO" sz="2000" dirty="0">
+                <a:solidFill>
+                  <a:srgbClr val="008000"/>
+                </a:solidFill>
+                <a:latin typeface="Consolas" panose="020B0609020204030204" pitchFamily="49" charset="0"/>
+              </a:rPr>
+              <a:t>Encontrar artistas que tienen conciertos con precio superior al promedio</a:t>
+            </a:r>
+            <a:endParaRPr lang="es-CO" sz="2000" dirty="0">
               <a:solidFill>
                 <a:srgbClr val="000000"/>
               </a:solidFill>
@@ -9729,16 +9561,16 @@
           </a:p>
           <a:p>
             <a:r>
-              <a:rPr lang="es-CO" sz="2800" dirty="0">
+              <a:rPr lang="es-CO" sz="2000" dirty="0">
                 <a:solidFill>
                   <a:srgbClr val="0000FF"/>
                 </a:solidFill>
                 <a:latin typeface="Consolas" panose="020B0609020204030204" pitchFamily="49" charset="0"/>
               </a:rPr>
-              <a:t>WHERE</a:t>
-            </a:r>
-            <a:r>
-              <a:rPr lang="es-CO" sz="2800" dirty="0">
+              <a:t>SELECT</a:t>
+            </a:r>
+            <a:r>
+              <a:rPr lang="es-CO" sz="2000" dirty="0">
                 <a:solidFill>
                   <a:srgbClr val="000000"/>
                 </a:solidFill>
@@ -9747,16 +9579,16 @@
               <a:t> </a:t>
             </a:r>
             <a:r>
-              <a:rPr lang="es-CO" sz="2800" dirty="0" err="1">
-                <a:solidFill>
-                  <a:srgbClr val="000000"/>
-                </a:solidFill>
-                <a:latin typeface="Consolas" panose="020B0609020204030204" pitchFamily="49" charset="0"/>
-              </a:rPr>
-              <a:t>cancionId</a:t>
-            </a:r>
-            <a:r>
-              <a:rPr lang="es-CO" sz="2800" dirty="0">
+              <a:rPr lang="es-CO" sz="2000" dirty="0">
+                <a:solidFill>
+                  <a:srgbClr val="0000FF"/>
+                </a:solidFill>
+                <a:latin typeface="Consolas" panose="020B0609020204030204" pitchFamily="49" charset="0"/>
+              </a:rPr>
+              <a:t>DISTINCT</a:t>
+            </a:r>
+            <a:r>
+              <a:rPr lang="es-CO" sz="2000" dirty="0">
                 <a:solidFill>
                   <a:srgbClr val="000000"/>
                 </a:solidFill>
@@ -9765,16 +9597,43 @@
               <a:t> </a:t>
             </a:r>
             <a:r>
-              <a:rPr lang="es-CO" sz="2800" dirty="0">
+              <a:rPr lang="es-CO" sz="2000" dirty="0" err="1">
+                <a:solidFill>
+                  <a:srgbClr val="000000"/>
+                </a:solidFill>
+                <a:latin typeface="Consolas" panose="020B0609020204030204" pitchFamily="49" charset="0"/>
+              </a:rPr>
+              <a:t>a</a:t>
+            </a:r>
+            <a:r>
+              <a:rPr lang="es-CO" sz="2000" dirty="0" err="1">
                 <a:solidFill>
                   <a:srgbClr val="808080"/>
                 </a:solidFill>
                 <a:latin typeface="Consolas" panose="020B0609020204030204" pitchFamily="49" charset="0"/>
               </a:rPr>
-              <a:t>NOT</a:t>
-            </a:r>
-            <a:r>
-              <a:rPr lang="es-CO" sz="2800" dirty="0">
+              <a:t>.</a:t>
+            </a:r>
+            <a:r>
+              <a:rPr lang="es-CO" sz="2000" dirty="0" err="1">
+                <a:solidFill>
+                  <a:srgbClr val="000000"/>
+                </a:solidFill>
+                <a:latin typeface="Consolas" panose="020B0609020204030204" pitchFamily="49" charset="0"/>
+              </a:rPr>
+              <a:t>nombre</a:t>
+            </a:r>
+            <a:r>
+              <a:rPr lang="es-CO" sz="2000" dirty="0">
+                <a:solidFill>
+                  <a:srgbClr val="808080"/>
+                </a:solidFill>
+                <a:latin typeface="Consolas" panose="020B0609020204030204" pitchFamily="49" charset="0"/>
+              </a:rPr>
+              <a:t>,</a:t>
+            </a:r>
+            <a:r>
+              <a:rPr lang="es-CO" sz="2000" dirty="0">
                 <a:solidFill>
                   <a:srgbClr val="000000"/>
                 </a:solidFill>
@@ -9783,33 +9642,33 @@
               <a:t> </a:t>
             </a:r>
             <a:r>
-              <a:rPr lang="es-CO" sz="2800" dirty="0">
+              <a:rPr lang="es-CO" sz="2000" dirty="0" err="1">
+                <a:solidFill>
+                  <a:srgbClr val="000000"/>
+                </a:solidFill>
+                <a:latin typeface="Consolas" panose="020B0609020204030204" pitchFamily="49" charset="0"/>
+              </a:rPr>
+              <a:t>c</a:t>
+            </a:r>
+            <a:r>
+              <a:rPr lang="es-CO" sz="2000" dirty="0" err="1">
                 <a:solidFill>
                   <a:srgbClr val="808080"/>
                 </a:solidFill>
                 <a:latin typeface="Consolas" panose="020B0609020204030204" pitchFamily="49" charset="0"/>
               </a:rPr>
-              <a:t>IN</a:t>
-            </a:r>
-            <a:r>
-              <a:rPr lang="es-CO" sz="2800" dirty="0">
-                <a:solidFill>
-                  <a:srgbClr val="0000FF"/>
-                </a:solidFill>
-                <a:latin typeface="Consolas" panose="020B0609020204030204" pitchFamily="49" charset="0"/>
-              </a:rPr>
-              <a:t> </a:t>
-            </a:r>
-            <a:r>
-              <a:rPr lang="es-CO" sz="2800" dirty="0">
-                <a:solidFill>
-                  <a:srgbClr val="808080"/>
-                </a:solidFill>
-                <a:latin typeface="Consolas" panose="020B0609020204030204" pitchFamily="49" charset="0"/>
-              </a:rPr>
-              <a:t>(</a:t>
-            </a:r>
-            <a:endParaRPr lang="es-CO" sz="2800" dirty="0">
+              <a:t>.</a:t>
+            </a:r>
+            <a:r>
+              <a:rPr lang="es-CO" sz="2000" dirty="0" err="1">
+                <a:solidFill>
+                  <a:srgbClr val="000000"/>
+                </a:solidFill>
+                <a:latin typeface="Consolas" panose="020B0609020204030204" pitchFamily="49" charset="0"/>
+              </a:rPr>
+              <a:t>precioBase</a:t>
+            </a:r>
+            <a:endParaRPr lang="es-CO" sz="2000" dirty="0">
               <a:solidFill>
                 <a:srgbClr val="000000"/>
               </a:solidFill>
@@ -9818,25 +9677,36 @@
           </a:p>
           <a:p>
             <a:r>
-              <a:rPr lang="es-CO" sz="2800" dirty="0">
-                <a:solidFill>
-                  <a:srgbClr val="000000"/>
-                </a:solidFill>
-                <a:latin typeface="Consolas" panose="020B0609020204030204" pitchFamily="49" charset="0"/>
-              </a:rPr>
-              <a:t>    </a:t>
-            </a:r>
-            <a:r>
-              <a:rPr lang="es-CO" sz="2800" dirty="0">
+              <a:rPr lang="es-CO" sz="2000" dirty="0">
                 <a:solidFill>
                   <a:srgbClr val="0000FF"/>
                 </a:solidFill>
                 <a:latin typeface="Consolas" panose="020B0609020204030204" pitchFamily="49" charset="0"/>
               </a:rPr>
-              <a:t>SELECT</a:t>
-            </a:r>
-            <a:r>
-              <a:rPr lang="es-CO" sz="2800" dirty="0">
+              <a:t>FROM</a:t>
+            </a:r>
+            <a:r>
+              <a:rPr lang="es-CO" sz="2000" dirty="0">
+                <a:solidFill>
+                  <a:srgbClr val="000000"/>
+                </a:solidFill>
+                <a:latin typeface="Consolas" panose="020B0609020204030204" pitchFamily="49" charset="0"/>
+              </a:rPr>
+              <a:t> Artista a</a:t>
+            </a:r>
+          </a:p>
+          <a:p>
+            <a:r>
+              <a:rPr lang="fr-FR" sz="2000" dirty="0">
+                <a:solidFill>
+                  <a:srgbClr val="808080"/>
+                </a:solidFill>
+                <a:latin typeface="Consolas" panose="020B0609020204030204" pitchFamily="49" charset="0"/>
+              </a:rPr>
+              <a:t>JOIN</a:t>
+            </a:r>
+            <a:r>
+              <a:rPr lang="fr-FR" sz="2000" dirty="0">
                 <a:solidFill>
                   <a:srgbClr val="000000"/>
                 </a:solidFill>
@@ -9845,16 +9715,34 @@
               <a:t> </a:t>
             </a:r>
             <a:r>
-              <a:rPr lang="es-CO" sz="2800" dirty="0" err="1">
-                <a:solidFill>
-                  <a:srgbClr val="000000"/>
-                </a:solidFill>
-                <a:latin typeface="Consolas" panose="020B0609020204030204" pitchFamily="49" charset="0"/>
-              </a:rPr>
-              <a:t>cancionId</a:t>
-            </a:r>
-            <a:r>
-              <a:rPr lang="es-CO" sz="2800" dirty="0">
+              <a:rPr lang="fr-FR" sz="2000" dirty="0" err="1">
+                <a:solidFill>
+                  <a:srgbClr val="000000"/>
+                </a:solidFill>
+                <a:latin typeface="Consolas" panose="020B0609020204030204" pitchFamily="49" charset="0"/>
+              </a:rPr>
+              <a:t>Concierto</a:t>
+            </a:r>
+            <a:r>
+              <a:rPr lang="fr-FR" sz="2000" dirty="0">
+                <a:solidFill>
+                  <a:srgbClr val="000000"/>
+                </a:solidFill>
+                <a:latin typeface="Consolas" panose="020B0609020204030204" pitchFamily="49" charset="0"/>
+              </a:rPr>
+              <a:t> c </a:t>
+            </a:r>
+            <a:r>
+              <a:rPr lang="fr-FR" sz="2000" dirty="0">
+                <a:solidFill>
+                  <a:srgbClr val="0000FF"/>
+                </a:solidFill>
+                <a:latin typeface="Consolas" panose="020B0609020204030204" pitchFamily="49" charset="0"/>
+              </a:rPr>
+              <a:t>ON</a:t>
+            </a:r>
+            <a:r>
+              <a:rPr lang="fr-FR" sz="2000" dirty="0">
                 <a:solidFill>
                   <a:srgbClr val="000000"/>
                 </a:solidFill>
@@ -9862,28 +9750,35 @@
               </a:rPr>
               <a:t> </a:t>
             </a:r>
-          </a:p>
-          <a:p>
-            <a:r>
-              <a:rPr lang="es-CO" sz="2800" dirty="0">
-                <a:solidFill>
-                  <a:srgbClr val="000000"/>
-                </a:solidFill>
-                <a:latin typeface="Consolas" panose="020B0609020204030204" pitchFamily="49" charset="0"/>
-              </a:rPr>
-              <a:t>    </a:t>
-            </a:r>
-            <a:r>
-              <a:rPr lang="es-CO" sz="2800" dirty="0">
-                <a:solidFill>
-                  <a:srgbClr val="0000FF"/>
-                </a:solidFill>
-                <a:latin typeface="Consolas" panose="020B0609020204030204" pitchFamily="49" charset="0"/>
-              </a:rPr>
-              <a:t>FROM</a:t>
-            </a:r>
-            <a:r>
-              <a:rPr lang="es-CO" sz="2800" dirty="0">
+            <a:r>
+              <a:rPr lang="fr-FR" sz="2000" dirty="0" err="1">
+                <a:solidFill>
+                  <a:srgbClr val="000000"/>
+                </a:solidFill>
+                <a:latin typeface="Consolas" panose="020B0609020204030204" pitchFamily="49" charset="0"/>
+              </a:rPr>
+              <a:t>a</a:t>
+            </a:r>
+            <a:r>
+              <a:rPr lang="fr-FR" sz="2000" dirty="0" err="1">
+                <a:solidFill>
+                  <a:srgbClr val="808080"/>
+                </a:solidFill>
+                <a:latin typeface="Consolas" panose="020B0609020204030204" pitchFamily="49" charset="0"/>
+              </a:rPr>
+              <a:t>.</a:t>
+            </a:r>
+            <a:r>
+              <a:rPr lang="fr-FR" sz="2000" dirty="0" err="1">
+                <a:solidFill>
+                  <a:srgbClr val="000000"/>
+                </a:solidFill>
+                <a:latin typeface="Consolas" panose="020B0609020204030204" pitchFamily="49" charset="0"/>
+              </a:rPr>
+              <a:t>artistaId</a:t>
+            </a:r>
+            <a:r>
+              <a:rPr lang="fr-FR" sz="2000" dirty="0">
                 <a:solidFill>
                   <a:srgbClr val="000000"/>
                 </a:solidFill>
@@ -9892,15 +9787,51 @@
               <a:t> </a:t>
             </a:r>
             <a:r>
-              <a:rPr lang="es-CO" sz="2800" dirty="0" err="1">
-                <a:solidFill>
-                  <a:srgbClr val="000000"/>
-                </a:solidFill>
-                <a:latin typeface="Consolas" panose="020B0609020204030204" pitchFamily="49" charset="0"/>
-              </a:rPr>
-              <a:t>Setlist</a:t>
-            </a:r>
-            <a:endParaRPr lang="es-CO" sz="2800" dirty="0">
+              <a:rPr lang="fr-FR" sz="2000" dirty="0">
+                <a:solidFill>
+                  <a:srgbClr val="808080"/>
+                </a:solidFill>
+                <a:latin typeface="Consolas" panose="020B0609020204030204" pitchFamily="49" charset="0"/>
+              </a:rPr>
+              <a:t>=</a:t>
+            </a:r>
+            <a:r>
+              <a:rPr lang="fr-FR" sz="2000" dirty="0">
+                <a:solidFill>
+                  <a:srgbClr val="000000"/>
+                </a:solidFill>
+                <a:latin typeface="Consolas" panose="020B0609020204030204" pitchFamily="49" charset="0"/>
+              </a:rPr>
+              <a:t> </a:t>
+            </a:r>
+            <a:r>
+              <a:rPr lang="fr-FR" sz="2000" dirty="0" err="1">
+                <a:solidFill>
+                  <a:srgbClr val="000000"/>
+                </a:solidFill>
+                <a:latin typeface="Consolas" panose="020B0609020204030204" pitchFamily="49" charset="0"/>
+              </a:rPr>
+              <a:t>c</a:t>
+            </a:r>
+            <a:r>
+              <a:rPr lang="fr-FR" sz="2000" dirty="0" err="1">
+                <a:solidFill>
+                  <a:srgbClr val="808080"/>
+                </a:solidFill>
+                <a:latin typeface="Consolas" panose="020B0609020204030204" pitchFamily="49" charset="0"/>
+              </a:rPr>
+              <a:t>.</a:t>
+            </a:r>
+            <a:r>
+              <a:rPr lang="fr-FR" sz="2000" dirty="0" err="1">
+                <a:solidFill>
+                  <a:srgbClr val="000000"/>
+                </a:solidFill>
+                <a:latin typeface="Consolas" panose="020B0609020204030204" pitchFamily="49" charset="0"/>
+              </a:rPr>
+              <a:t>artistaPrincipalId</a:t>
+            </a:r>
+            <a:endParaRPr lang="fr-FR" sz="2000" dirty="0">
               <a:solidFill>
                 <a:srgbClr val="000000"/>
               </a:solidFill>
@@ -9909,15 +9840,207 @@
           </a:p>
           <a:p>
             <a:r>
-              <a:rPr lang="es-CO" sz="2800" dirty="0">
+              <a:rPr lang="es-CO" sz="2000" dirty="0">
+                <a:solidFill>
+                  <a:srgbClr val="0000FF"/>
+                </a:solidFill>
+                <a:latin typeface="Consolas" panose="020B0609020204030204" pitchFamily="49" charset="0"/>
+              </a:rPr>
+              <a:t>WHERE</a:t>
+            </a:r>
+            <a:r>
+              <a:rPr lang="es-CO" sz="2000" dirty="0">
+                <a:solidFill>
+                  <a:srgbClr val="000000"/>
+                </a:solidFill>
+                <a:latin typeface="Consolas" panose="020B0609020204030204" pitchFamily="49" charset="0"/>
+              </a:rPr>
+              <a:t> </a:t>
+            </a:r>
+            <a:r>
+              <a:rPr lang="es-CO" sz="2000" dirty="0" err="1">
+                <a:solidFill>
+                  <a:srgbClr val="000000"/>
+                </a:solidFill>
+                <a:latin typeface="Consolas" panose="020B0609020204030204" pitchFamily="49" charset="0"/>
+              </a:rPr>
+              <a:t>c</a:t>
+            </a:r>
+            <a:r>
+              <a:rPr lang="es-CO" sz="2000" dirty="0" err="1">
                 <a:solidFill>
                   <a:srgbClr val="808080"/>
                 </a:solidFill>
                 <a:latin typeface="Consolas" panose="020B0609020204030204" pitchFamily="49" charset="0"/>
               </a:rPr>
+              <a:t>.</a:t>
+            </a:r>
+            <a:r>
+              <a:rPr lang="es-CO" sz="2000" dirty="0" err="1">
+                <a:solidFill>
+                  <a:srgbClr val="000000"/>
+                </a:solidFill>
+                <a:latin typeface="Consolas" panose="020B0609020204030204" pitchFamily="49" charset="0"/>
+              </a:rPr>
+              <a:t>precioBase</a:t>
+            </a:r>
+            <a:r>
+              <a:rPr lang="es-CO" sz="2000" dirty="0">
+                <a:solidFill>
+                  <a:srgbClr val="000000"/>
+                </a:solidFill>
+                <a:latin typeface="Consolas" panose="020B0609020204030204" pitchFamily="49" charset="0"/>
+              </a:rPr>
+              <a:t> </a:t>
+            </a:r>
+            <a:r>
+              <a:rPr lang="es-CO" sz="2000" dirty="0">
+                <a:solidFill>
+                  <a:srgbClr val="808080"/>
+                </a:solidFill>
+                <a:latin typeface="Consolas" panose="020B0609020204030204" pitchFamily="49" charset="0"/>
+              </a:rPr>
+              <a:t>&gt;</a:t>
+            </a:r>
+            <a:r>
+              <a:rPr lang="es-CO" sz="2000" dirty="0">
+                <a:solidFill>
+                  <a:srgbClr val="0000FF"/>
+                </a:solidFill>
+                <a:latin typeface="Consolas" panose="020B0609020204030204" pitchFamily="49" charset="0"/>
+              </a:rPr>
+              <a:t> </a:t>
+            </a:r>
+            <a:r>
+              <a:rPr lang="es-CO" sz="2000" dirty="0">
+                <a:solidFill>
+                  <a:srgbClr val="808080"/>
+                </a:solidFill>
+                <a:latin typeface="Consolas" panose="020B0609020204030204" pitchFamily="49" charset="0"/>
+              </a:rPr>
+              <a:t>(</a:t>
+            </a:r>
+            <a:endParaRPr lang="es-CO" sz="2000" dirty="0">
+              <a:solidFill>
+                <a:srgbClr val="000000"/>
+              </a:solidFill>
+              <a:latin typeface="Consolas" panose="020B0609020204030204" pitchFamily="49" charset="0"/>
+            </a:endParaRPr>
+          </a:p>
+          <a:p>
+            <a:r>
+              <a:rPr lang="es-CO" sz="2000" dirty="0">
+                <a:solidFill>
+                  <a:srgbClr val="000000"/>
+                </a:solidFill>
+                <a:latin typeface="Consolas" panose="020B0609020204030204" pitchFamily="49" charset="0"/>
+              </a:rPr>
+              <a:t>    </a:t>
+            </a:r>
+            <a:r>
+              <a:rPr lang="es-CO" sz="2000" dirty="0">
+                <a:solidFill>
+                  <a:srgbClr val="0000FF"/>
+                </a:solidFill>
+                <a:latin typeface="Consolas" panose="020B0609020204030204" pitchFamily="49" charset="0"/>
+              </a:rPr>
+              <a:t>SELECT</a:t>
+            </a:r>
+            <a:r>
+              <a:rPr lang="es-CO" sz="2000" dirty="0">
+                <a:solidFill>
+                  <a:srgbClr val="000000"/>
+                </a:solidFill>
+                <a:latin typeface="Consolas" panose="020B0609020204030204" pitchFamily="49" charset="0"/>
+              </a:rPr>
+              <a:t> </a:t>
+            </a:r>
+            <a:r>
+              <a:rPr lang="es-CO" sz="2000" dirty="0">
+                <a:solidFill>
+                  <a:srgbClr val="FF00FF"/>
+                </a:solidFill>
+                <a:latin typeface="Consolas" panose="020B0609020204030204" pitchFamily="49" charset="0"/>
+              </a:rPr>
+              <a:t>AVG</a:t>
+            </a:r>
+            <a:r>
+              <a:rPr lang="es-CO" sz="2000" dirty="0">
+                <a:solidFill>
+                  <a:srgbClr val="808080"/>
+                </a:solidFill>
+                <a:latin typeface="Consolas" panose="020B0609020204030204" pitchFamily="49" charset="0"/>
+              </a:rPr>
+              <a:t>(</a:t>
+            </a:r>
+            <a:r>
+              <a:rPr lang="es-CO" sz="2000" dirty="0" err="1">
+                <a:solidFill>
+                  <a:srgbClr val="000000"/>
+                </a:solidFill>
+                <a:latin typeface="Consolas" panose="020B0609020204030204" pitchFamily="49" charset="0"/>
+              </a:rPr>
+              <a:t>precioBase</a:t>
+            </a:r>
+            <a:r>
+              <a:rPr lang="es-CO" sz="2000" dirty="0">
+                <a:solidFill>
+                  <a:srgbClr val="808080"/>
+                </a:solidFill>
+                <a:latin typeface="Consolas" panose="020B0609020204030204" pitchFamily="49" charset="0"/>
+              </a:rPr>
+              <a:t>)</a:t>
+            </a:r>
+            <a:r>
+              <a:rPr lang="es-CO" sz="2000" dirty="0">
+                <a:solidFill>
+                  <a:srgbClr val="000000"/>
+                </a:solidFill>
+                <a:latin typeface="Consolas" panose="020B0609020204030204" pitchFamily="49" charset="0"/>
+              </a:rPr>
+              <a:t> </a:t>
+            </a:r>
+          </a:p>
+          <a:p>
+            <a:r>
+              <a:rPr lang="es-CO" sz="2000" dirty="0">
+                <a:solidFill>
+                  <a:srgbClr val="000000"/>
+                </a:solidFill>
+                <a:latin typeface="Consolas" panose="020B0609020204030204" pitchFamily="49" charset="0"/>
+              </a:rPr>
+              <a:t>    </a:t>
+            </a:r>
+            <a:r>
+              <a:rPr lang="es-CO" sz="2000" dirty="0">
+                <a:solidFill>
+                  <a:srgbClr val="0000FF"/>
+                </a:solidFill>
+                <a:latin typeface="Consolas" panose="020B0609020204030204" pitchFamily="49" charset="0"/>
+              </a:rPr>
+              <a:t>FROM</a:t>
+            </a:r>
+            <a:r>
+              <a:rPr lang="es-CO" sz="2000" dirty="0">
+                <a:solidFill>
+                  <a:srgbClr val="000000"/>
+                </a:solidFill>
+                <a:latin typeface="Consolas" panose="020B0609020204030204" pitchFamily="49" charset="0"/>
+              </a:rPr>
+              <a:t> Concierto</a:t>
+            </a:r>
+          </a:p>
+          <a:p>
+            <a:r>
+              <a:rPr lang="es-CO" sz="2000" dirty="0">
+                <a:solidFill>
+                  <a:srgbClr val="808080"/>
+                </a:solidFill>
+                <a:latin typeface="Consolas" panose="020B0609020204030204" pitchFamily="49" charset="0"/>
+              </a:rPr>
               <a:t>);</a:t>
             </a:r>
-            <a:endParaRPr lang="es-CO" sz="2800" dirty="0"/>
+            <a:endParaRPr lang="es-CO" sz="3200" dirty="0"/>
           </a:p>
         </p:txBody>
       </p:sp>
@@ -9935,6 +10058,1653 @@
 </file>
 
 <file path=ppt/slides/slide23.xml><?xml version="1.0" encoding="utf-8"?>
+<p:sld xmlns:a="http://schemas.openxmlformats.org/drawingml/2006/main" xmlns:r="http://schemas.openxmlformats.org/officeDocument/2006/relationships" xmlns:p="http://schemas.openxmlformats.org/presentationml/2006/main">
+  <p:cSld>
+    <p:spTree>
+      <p:nvGrpSpPr>
+        <p:cNvPr id="1" name="">
+          <a:extLst>
+            <a:ext uri="{FF2B5EF4-FFF2-40B4-BE49-F238E27FC236}">
+              <a16:creationId xmlns:a16="http://schemas.microsoft.com/office/drawing/2014/main" id="{C3DCB194-9A43-E9D8-B1DB-2D92A3C6B051}"/>
+            </a:ext>
+          </a:extLst>
+        </p:cNvPr>
+        <p:cNvGrpSpPr/>
+        <p:nvPr/>
+      </p:nvGrpSpPr>
+      <p:grpSpPr>
+        <a:xfrm>
+          <a:off x="0" y="0"/>
+          <a:ext cx="0" cy="0"/>
+          <a:chOff x="0" y="0"/>
+          <a:chExt cx="0" cy="0"/>
+        </a:xfrm>
+      </p:grpSpPr>
+      <p:sp>
+        <p:nvSpPr>
+          <p:cNvPr id="2" name="CuadroTexto 1">
+            <a:extLst>
+              <a:ext uri="{FF2B5EF4-FFF2-40B4-BE49-F238E27FC236}">
+                <a16:creationId xmlns:a16="http://schemas.microsoft.com/office/drawing/2014/main" id="{DD79243C-F378-19FA-E4B6-4A255AD3FC7F}"/>
+              </a:ext>
+            </a:extLst>
+          </p:cNvPr>
+          <p:cNvSpPr txBox="1"/>
+          <p:nvPr/>
+        </p:nvSpPr>
+        <p:spPr>
+          <a:xfrm>
+            <a:off x="3201852" y="191593"/>
+            <a:ext cx="5788316" cy="707886"/>
+          </a:xfrm>
+          <a:prstGeom prst="rect">
+            <a:avLst/>
+          </a:prstGeom>
+          <a:noFill/>
+        </p:spPr>
+        <p:txBody>
+          <a:bodyPr wrap="none" rtlCol="0">
+            <a:spAutoFit/>
+          </a:bodyPr>
+          <a:lstStyle/>
+          <a:p>
+            <a:pPr algn="ctr"/>
+            <a:r>
+              <a:rPr lang="es-CO" sz="4000" b="1" dirty="0"/>
+              <a:t>SUBQUERIES - EJEMPLO</a:t>
+            </a:r>
+          </a:p>
+        </p:txBody>
+      </p:sp>
+      <p:sp>
+        <p:nvSpPr>
+          <p:cNvPr id="7" name="CuadroTexto 6">
+            <a:extLst>
+              <a:ext uri="{FF2B5EF4-FFF2-40B4-BE49-F238E27FC236}">
+                <a16:creationId xmlns:a16="http://schemas.microsoft.com/office/drawing/2014/main" id="{F3F3221F-CFD6-29E3-02BC-C99551B36701}"/>
+              </a:ext>
+            </a:extLst>
+          </p:cNvPr>
+          <p:cNvSpPr txBox="1"/>
+          <p:nvPr/>
+        </p:nvSpPr>
+        <p:spPr>
+          <a:xfrm>
+            <a:off x="2026920" y="1744732"/>
+            <a:ext cx="8138160" cy="3508653"/>
+          </a:xfrm>
+          <a:prstGeom prst="rect">
+            <a:avLst/>
+          </a:prstGeom>
+          <a:noFill/>
+        </p:spPr>
+        <p:txBody>
+          <a:bodyPr wrap="square">
+            <a:spAutoFit/>
+          </a:bodyPr>
+          <a:lstStyle/>
+          <a:p>
+            <a:r>
+              <a:rPr lang="es-CO" sz="2000" dirty="0">
+                <a:solidFill>
+                  <a:srgbClr val="008000"/>
+                </a:solidFill>
+                <a:latin typeface="Consolas" panose="020B0609020204030204" pitchFamily="49" charset="0"/>
+              </a:rPr>
+              <a:t>Artistas con conciertos más caros que cualquier concierto de Taylor Swift</a:t>
+            </a:r>
+          </a:p>
+          <a:p>
+            <a:endParaRPr lang="es-CO" sz="2000" dirty="0">
+              <a:solidFill>
+                <a:srgbClr val="008000"/>
+              </a:solidFill>
+              <a:latin typeface="Consolas" panose="020B0609020204030204" pitchFamily="49" charset="0"/>
+            </a:endParaRPr>
+          </a:p>
+          <a:p>
+            <a:r>
+              <a:rPr lang="es-CO" sz="1800" dirty="0">
+                <a:solidFill>
+                  <a:srgbClr val="0000FF"/>
+                </a:solidFill>
+                <a:latin typeface="Consolas" panose="020B0609020204030204" pitchFamily="49" charset="0"/>
+              </a:rPr>
+              <a:t>SELECT</a:t>
+            </a:r>
+            <a:r>
+              <a:rPr lang="es-CO" sz="1800" dirty="0">
+                <a:solidFill>
+                  <a:srgbClr val="000000"/>
+                </a:solidFill>
+                <a:latin typeface="Consolas" panose="020B0609020204030204" pitchFamily="49" charset="0"/>
+              </a:rPr>
+              <a:t> </a:t>
+            </a:r>
+            <a:r>
+              <a:rPr lang="es-CO" sz="1800" dirty="0">
+                <a:solidFill>
+                  <a:srgbClr val="0000FF"/>
+                </a:solidFill>
+                <a:latin typeface="Consolas" panose="020B0609020204030204" pitchFamily="49" charset="0"/>
+              </a:rPr>
+              <a:t>DISTINCT</a:t>
+            </a:r>
+            <a:r>
+              <a:rPr lang="es-CO" sz="1800" dirty="0">
+                <a:solidFill>
+                  <a:srgbClr val="000000"/>
+                </a:solidFill>
+                <a:latin typeface="Consolas" panose="020B0609020204030204" pitchFamily="49" charset="0"/>
+              </a:rPr>
+              <a:t> </a:t>
+            </a:r>
+            <a:r>
+              <a:rPr lang="es-CO" sz="1800" dirty="0" err="1">
+                <a:solidFill>
+                  <a:srgbClr val="000000"/>
+                </a:solidFill>
+                <a:latin typeface="Consolas" panose="020B0609020204030204" pitchFamily="49" charset="0"/>
+              </a:rPr>
+              <a:t>a</a:t>
+            </a:r>
+            <a:r>
+              <a:rPr lang="es-CO" sz="1800" dirty="0" err="1">
+                <a:solidFill>
+                  <a:srgbClr val="808080"/>
+                </a:solidFill>
+                <a:latin typeface="Consolas" panose="020B0609020204030204" pitchFamily="49" charset="0"/>
+              </a:rPr>
+              <a:t>.</a:t>
+            </a:r>
+            <a:r>
+              <a:rPr lang="es-CO" sz="1800" dirty="0" err="1">
+                <a:solidFill>
+                  <a:srgbClr val="000000"/>
+                </a:solidFill>
+                <a:latin typeface="Consolas" panose="020B0609020204030204" pitchFamily="49" charset="0"/>
+              </a:rPr>
+              <a:t>nombre</a:t>
+            </a:r>
+            <a:endParaRPr lang="es-CO" sz="1800" dirty="0">
+              <a:solidFill>
+                <a:srgbClr val="000000"/>
+              </a:solidFill>
+              <a:latin typeface="Consolas" panose="020B0609020204030204" pitchFamily="49" charset="0"/>
+            </a:endParaRPr>
+          </a:p>
+          <a:p>
+            <a:r>
+              <a:rPr lang="es-CO" sz="1800" dirty="0">
+                <a:solidFill>
+                  <a:srgbClr val="0000FF"/>
+                </a:solidFill>
+                <a:latin typeface="Consolas" panose="020B0609020204030204" pitchFamily="49" charset="0"/>
+              </a:rPr>
+              <a:t>FROM</a:t>
+            </a:r>
+            <a:r>
+              <a:rPr lang="es-CO" sz="1800" dirty="0">
+                <a:solidFill>
+                  <a:srgbClr val="000000"/>
+                </a:solidFill>
+                <a:latin typeface="Consolas" panose="020B0609020204030204" pitchFamily="49" charset="0"/>
+              </a:rPr>
+              <a:t> Artista a</a:t>
+            </a:r>
+          </a:p>
+          <a:p>
+            <a:r>
+              <a:rPr lang="fr-FR" sz="1800" dirty="0">
+                <a:solidFill>
+                  <a:srgbClr val="808080"/>
+                </a:solidFill>
+                <a:latin typeface="Consolas" panose="020B0609020204030204" pitchFamily="49" charset="0"/>
+              </a:rPr>
+              <a:t>JOIN</a:t>
+            </a:r>
+            <a:r>
+              <a:rPr lang="fr-FR" sz="1800" dirty="0">
+                <a:solidFill>
+                  <a:srgbClr val="000000"/>
+                </a:solidFill>
+                <a:latin typeface="Consolas" panose="020B0609020204030204" pitchFamily="49" charset="0"/>
+              </a:rPr>
+              <a:t> </a:t>
+            </a:r>
+            <a:r>
+              <a:rPr lang="fr-FR" sz="1800" dirty="0" err="1">
+                <a:solidFill>
+                  <a:srgbClr val="000000"/>
+                </a:solidFill>
+                <a:latin typeface="Consolas" panose="020B0609020204030204" pitchFamily="49" charset="0"/>
+              </a:rPr>
+              <a:t>Concierto</a:t>
+            </a:r>
+            <a:r>
+              <a:rPr lang="fr-FR" sz="1800" dirty="0">
+                <a:solidFill>
+                  <a:srgbClr val="000000"/>
+                </a:solidFill>
+                <a:latin typeface="Consolas" panose="020B0609020204030204" pitchFamily="49" charset="0"/>
+              </a:rPr>
+              <a:t> c </a:t>
+            </a:r>
+            <a:r>
+              <a:rPr lang="fr-FR" sz="1800" dirty="0">
+                <a:solidFill>
+                  <a:srgbClr val="0000FF"/>
+                </a:solidFill>
+                <a:latin typeface="Consolas" panose="020B0609020204030204" pitchFamily="49" charset="0"/>
+              </a:rPr>
+              <a:t>ON</a:t>
+            </a:r>
+            <a:r>
+              <a:rPr lang="fr-FR" sz="1800" dirty="0">
+                <a:solidFill>
+                  <a:srgbClr val="000000"/>
+                </a:solidFill>
+                <a:latin typeface="Consolas" panose="020B0609020204030204" pitchFamily="49" charset="0"/>
+              </a:rPr>
+              <a:t> </a:t>
+            </a:r>
+            <a:r>
+              <a:rPr lang="fr-FR" sz="1800" dirty="0" err="1">
+                <a:solidFill>
+                  <a:srgbClr val="000000"/>
+                </a:solidFill>
+                <a:latin typeface="Consolas" panose="020B0609020204030204" pitchFamily="49" charset="0"/>
+              </a:rPr>
+              <a:t>a</a:t>
+            </a:r>
+            <a:r>
+              <a:rPr lang="fr-FR" sz="1800" dirty="0" err="1">
+                <a:solidFill>
+                  <a:srgbClr val="808080"/>
+                </a:solidFill>
+                <a:latin typeface="Consolas" panose="020B0609020204030204" pitchFamily="49" charset="0"/>
+              </a:rPr>
+              <a:t>.</a:t>
+            </a:r>
+            <a:r>
+              <a:rPr lang="fr-FR" sz="1800" dirty="0" err="1">
+                <a:solidFill>
+                  <a:srgbClr val="000000"/>
+                </a:solidFill>
+                <a:latin typeface="Consolas" panose="020B0609020204030204" pitchFamily="49" charset="0"/>
+              </a:rPr>
+              <a:t>artistaId</a:t>
+            </a:r>
+            <a:r>
+              <a:rPr lang="fr-FR" sz="1800" dirty="0">
+                <a:solidFill>
+                  <a:srgbClr val="000000"/>
+                </a:solidFill>
+                <a:latin typeface="Consolas" panose="020B0609020204030204" pitchFamily="49" charset="0"/>
+              </a:rPr>
+              <a:t> </a:t>
+            </a:r>
+            <a:r>
+              <a:rPr lang="fr-FR" sz="1800" dirty="0">
+                <a:solidFill>
+                  <a:srgbClr val="808080"/>
+                </a:solidFill>
+                <a:latin typeface="Consolas" panose="020B0609020204030204" pitchFamily="49" charset="0"/>
+              </a:rPr>
+              <a:t>=</a:t>
+            </a:r>
+            <a:r>
+              <a:rPr lang="fr-FR" sz="1800" dirty="0">
+                <a:solidFill>
+                  <a:srgbClr val="000000"/>
+                </a:solidFill>
+                <a:latin typeface="Consolas" panose="020B0609020204030204" pitchFamily="49" charset="0"/>
+              </a:rPr>
+              <a:t> </a:t>
+            </a:r>
+            <a:r>
+              <a:rPr lang="fr-FR" sz="1800" dirty="0" err="1">
+                <a:solidFill>
+                  <a:srgbClr val="000000"/>
+                </a:solidFill>
+                <a:latin typeface="Consolas" panose="020B0609020204030204" pitchFamily="49" charset="0"/>
+              </a:rPr>
+              <a:t>c</a:t>
+            </a:r>
+            <a:r>
+              <a:rPr lang="fr-FR" sz="1800" dirty="0" err="1">
+                <a:solidFill>
+                  <a:srgbClr val="808080"/>
+                </a:solidFill>
+                <a:latin typeface="Consolas" panose="020B0609020204030204" pitchFamily="49" charset="0"/>
+              </a:rPr>
+              <a:t>.</a:t>
+            </a:r>
+            <a:r>
+              <a:rPr lang="fr-FR" sz="1800" dirty="0" err="1">
+                <a:solidFill>
+                  <a:srgbClr val="000000"/>
+                </a:solidFill>
+                <a:latin typeface="Consolas" panose="020B0609020204030204" pitchFamily="49" charset="0"/>
+              </a:rPr>
+              <a:t>artistaPrincipalId</a:t>
+            </a:r>
+            <a:endParaRPr lang="fr-FR" sz="1800" dirty="0">
+              <a:solidFill>
+                <a:srgbClr val="000000"/>
+              </a:solidFill>
+              <a:latin typeface="Consolas" panose="020B0609020204030204" pitchFamily="49" charset="0"/>
+            </a:endParaRPr>
+          </a:p>
+          <a:p>
+            <a:r>
+              <a:rPr lang="es-CO" sz="1800" dirty="0">
+                <a:solidFill>
+                  <a:srgbClr val="0000FF"/>
+                </a:solidFill>
+                <a:latin typeface="Consolas" panose="020B0609020204030204" pitchFamily="49" charset="0"/>
+              </a:rPr>
+              <a:t>WHERE</a:t>
+            </a:r>
+            <a:r>
+              <a:rPr lang="es-CO" sz="1800" dirty="0">
+                <a:solidFill>
+                  <a:srgbClr val="000000"/>
+                </a:solidFill>
+                <a:latin typeface="Consolas" panose="020B0609020204030204" pitchFamily="49" charset="0"/>
+              </a:rPr>
+              <a:t> </a:t>
+            </a:r>
+            <a:r>
+              <a:rPr lang="es-CO" sz="1800" dirty="0" err="1">
+                <a:solidFill>
+                  <a:srgbClr val="000000"/>
+                </a:solidFill>
+                <a:latin typeface="Consolas" panose="020B0609020204030204" pitchFamily="49" charset="0"/>
+              </a:rPr>
+              <a:t>c</a:t>
+            </a:r>
+            <a:r>
+              <a:rPr lang="es-CO" sz="1800" dirty="0" err="1">
+                <a:solidFill>
+                  <a:srgbClr val="808080"/>
+                </a:solidFill>
+                <a:latin typeface="Consolas" panose="020B0609020204030204" pitchFamily="49" charset="0"/>
+              </a:rPr>
+              <a:t>.</a:t>
+            </a:r>
+            <a:r>
+              <a:rPr lang="es-CO" sz="1800" dirty="0" err="1">
+                <a:solidFill>
+                  <a:srgbClr val="000000"/>
+                </a:solidFill>
+                <a:latin typeface="Consolas" panose="020B0609020204030204" pitchFamily="49" charset="0"/>
+              </a:rPr>
+              <a:t>precioBase</a:t>
+            </a:r>
+            <a:r>
+              <a:rPr lang="es-CO" sz="1800" dirty="0">
+                <a:solidFill>
+                  <a:srgbClr val="000000"/>
+                </a:solidFill>
+                <a:latin typeface="Consolas" panose="020B0609020204030204" pitchFamily="49" charset="0"/>
+              </a:rPr>
+              <a:t> </a:t>
+            </a:r>
+            <a:r>
+              <a:rPr lang="es-CO" sz="1800" dirty="0">
+                <a:solidFill>
+                  <a:srgbClr val="808080"/>
+                </a:solidFill>
+                <a:latin typeface="Consolas" panose="020B0609020204030204" pitchFamily="49" charset="0"/>
+              </a:rPr>
+              <a:t>&gt;</a:t>
+            </a:r>
+            <a:r>
+              <a:rPr lang="es-CO" sz="1800" dirty="0">
+                <a:solidFill>
+                  <a:srgbClr val="0000FF"/>
+                </a:solidFill>
+                <a:latin typeface="Consolas" panose="020B0609020204030204" pitchFamily="49" charset="0"/>
+              </a:rPr>
+              <a:t> </a:t>
+            </a:r>
+            <a:r>
+              <a:rPr lang="es-CO" sz="1800" dirty="0">
+                <a:solidFill>
+                  <a:srgbClr val="808080"/>
+                </a:solidFill>
+                <a:latin typeface="Consolas" panose="020B0609020204030204" pitchFamily="49" charset="0"/>
+              </a:rPr>
+              <a:t>(</a:t>
+            </a:r>
+            <a:endParaRPr lang="es-CO" sz="1800" dirty="0">
+              <a:solidFill>
+                <a:srgbClr val="000000"/>
+              </a:solidFill>
+              <a:latin typeface="Consolas" panose="020B0609020204030204" pitchFamily="49" charset="0"/>
+            </a:endParaRPr>
+          </a:p>
+          <a:p>
+            <a:r>
+              <a:rPr lang="es-CO" sz="1800" dirty="0">
+                <a:solidFill>
+                  <a:srgbClr val="000000"/>
+                </a:solidFill>
+                <a:latin typeface="Consolas" panose="020B0609020204030204" pitchFamily="49" charset="0"/>
+              </a:rPr>
+              <a:t>    </a:t>
+            </a:r>
+            <a:r>
+              <a:rPr lang="es-CO" sz="1800" dirty="0">
+                <a:solidFill>
+                  <a:srgbClr val="0000FF"/>
+                </a:solidFill>
+                <a:latin typeface="Consolas" panose="020B0609020204030204" pitchFamily="49" charset="0"/>
+              </a:rPr>
+              <a:t>SELECT</a:t>
+            </a:r>
+            <a:r>
+              <a:rPr lang="es-CO" sz="1800" dirty="0">
+                <a:solidFill>
+                  <a:srgbClr val="000000"/>
+                </a:solidFill>
+                <a:latin typeface="Consolas" panose="020B0609020204030204" pitchFamily="49" charset="0"/>
+              </a:rPr>
+              <a:t> </a:t>
+            </a:r>
+            <a:r>
+              <a:rPr lang="es-CO" sz="1800" dirty="0">
+                <a:solidFill>
+                  <a:srgbClr val="FF00FF"/>
+                </a:solidFill>
+                <a:latin typeface="Consolas" panose="020B0609020204030204" pitchFamily="49" charset="0"/>
+              </a:rPr>
+              <a:t>MIN</a:t>
+            </a:r>
+            <a:r>
+              <a:rPr lang="es-CO" sz="1800" dirty="0">
+                <a:solidFill>
+                  <a:srgbClr val="808080"/>
+                </a:solidFill>
+                <a:latin typeface="Consolas" panose="020B0609020204030204" pitchFamily="49" charset="0"/>
+              </a:rPr>
+              <a:t>(</a:t>
+            </a:r>
+            <a:r>
+              <a:rPr lang="es-CO" sz="1800" dirty="0" err="1">
+                <a:solidFill>
+                  <a:srgbClr val="000000"/>
+                </a:solidFill>
+                <a:latin typeface="Consolas" panose="020B0609020204030204" pitchFamily="49" charset="0"/>
+              </a:rPr>
+              <a:t>precioBase</a:t>
+            </a:r>
+            <a:r>
+              <a:rPr lang="es-CO" sz="1800" dirty="0">
+                <a:solidFill>
+                  <a:srgbClr val="808080"/>
+                </a:solidFill>
+                <a:latin typeface="Consolas" panose="020B0609020204030204" pitchFamily="49" charset="0"/>
+              </a:rPr>
+              <a:t>)</a:t>
+            </a:r>
+            <a:endParaRPr lang="es-CO" sz="1800" dirty="0">
+              <a:solidFill>
+                <a:srgbClr val="000000"/>
+              </a:solidFill>
+              <a:latin typeface="Consolas" panose="020B0609020204030204" pitchFamily="49" charset="0"/>
+            </a:endParaRPr>
+          </a:p>
+          <a:p>
+            <a:r>
+              <a:rPr lang="es-CO" sz="1800" dirty="0">
+                <a:solidFill>
+                  <a:srgbClr val="000000"/>
+                </a:solidFill>
+                <a:latin typeface="Consolas" panose="020B0609020204030204" pitchFamily="49" charset="0"/>
+              </a:rPr>
+              <a:t>    </a:t>
+            </a:r>
+            <a:r>
+              <a:rPr lang="es-CO" sz="1800" dirty="0">
+                <a:solidFill>
+                  <a:srgbClr val="0000FF"/>
+                </a:solidFill>
+                <a:latin typeface="Consolas" panose="020B0609020204030204" pitchFamily="49" charset="0"/>
+              </a:rPr>
+              <a:t>FROM</a:t>
+            </a:r>
+            <a:r>
+              <a:rPr lang="es-CO" sz="1800" dirty="0">
+                <a:solidFill>
+                  <a:srgbClr val="000000"/>
+                </a:solidFill>
+                <a:latin typeface="Consolas" panose="020B0609020204030204" pitchFamily="49" charset="0"/>
+              </a:rPr>
+              <a:t> Concierto </a:t>
+            </a:r>
+            <a:r>
+              <a:rPr lang="es-CO" sz="1800" dirty="0">
+                <a:solidFill>
+                  <a:srgbClr val="0000FF"/>
+                </a:solidFill>
+                <a:latin typeface="Consolas" panose="020B0609020204030204" pitchFamily="49" charset="0"/>
+              </a:rPr>
+              <a:t>as</a:t>
+            </a:r>
+            <a:r>
+              <a:rPr lang="es-CO" sz="1800" dirty="0">
+                <a:solidFill>
+                  <a:srgbClr val="000000"/>
+                </a:solidFill>
+                <a:latin typeface="Consolas" panose="020B0609020204030204" pitchFamily="49" charset="0"/>
+              </a:rPr>
+              <a:t> c</a:t>
+            </a:r>
+          </a:p>
+          <a:p>
+            <a:r>
+              <a:rPr lang="es-CO" sz="1800" dirty="0">
+                <a:solidFill>
+                  <a:srgbClr val="000000"/>
+                </a:solidFill>
+                <a:latin typeface="Consolas" panose="020B0609020204030204" pitchFamily="49" charset="0"/>
+              </a:rPr>
+              <a:t>    </a:t>
+            </a:r>
+            <a:r>
+              <a:rPr lang="es-CO" sz="1800" dirty="0">
+                <a:solidFill>
+                  <a:srgbClr val="808080"/>
+                </a:solidFill>
+                <a:latin typeface="Consolas" panose="020B0609020204030204" pitchFamily="49" charset="0"/>
+              </a:rPr>
+              <a:t>JOIN</a:t>
+            </a:r>
+            <a:r>
+              <a:rPr lang="es-CO" sz="1800" dirty="0">
+                <a:solidFill>
+                  <a:srgbClr val="000000"/>
+                </a:solidFill>
+                <a:latin typeface="Consolas" panose="020B0609020204030204" pitchFamily="49" charset="0"/>
+              </a:rPr>
+              <a:t> Artista </a:t>
+            </a:r>
+            <a:r>
+              <a:rPr lang="es-CO" sz="1800" dirty="0">
+                <a:solidFill>
+                  <a:srgbClr val="0000FF"/>
+                </a:solidFill>
+                <a:latin typeface="Consolas" panose="020B0609020204030204" pitchFamily="49" charset="0"/>
+              </a:rPr>
+              <a:t>as</a:t>
+            </a:r>
+            <a:r>
+              <a:rPr lang="es-CO" sz="1800" dirty="0">
+                <a:solidFill>
+                  <a:srgbClr val="000000"/>
+                </a:solidFill>
+                <a:latin typeface="Consolas" panose="020B0609020204030204" pitchFamily="49" charset="0"/>
+              </a:rPr>
+              <a:t> a </a:t>
+            </a:r>
+            <a:r>
+              <a:rPr lang="es-CO" sz="1800" dirty="0" err="1">
+                <a:solidFill>
+                  <a:srgbClr val="0000FF"/>
+                </a:solidFill>
+                <a:latin typeface="Consolas" panose="020B0609020204030204" pitchFamily="49" charset="0"/>
+              </a:rPr>
+              <a:t>on</a:t>
+            </a:r>
+            <a:r>
+              <a:rPr lang="es-CO" sz="1800" dirty="0">
+                <a:solidFill>
+                  <a:srgbClr val="000000"/>
+                </a:solidFill>
+                <a:latin typeface="Consolas" panose="020B0609020204030204" pitchFamily="49" charset="0"/>
+              </a:rPr>
+              <a:t> </a:t>
+            </a:r>
+            <a:r>
+              <a:rPr lang="es-CO" sz="1800" dirty="0" err="1">
+                <a:solidFill>
+                  <a:srgbClr val="000000"/>
+                </a:solidFill>
+                <a:latin typeface="Consolas" panose="020B0609020204030204" pitchFamily="49" charset="0"/>
+              </a:rPr>
+              <a:t>a</a:t>
+            </a:r>
+            <a:r>
+              <a:rPr lang="es-CO" sz="1800" dirty="0" err="1">
+                <a:solidFill>
+                  <a:srgbClr val="808080"/>
+                </a:solidFill>
+                <a:latin typeface="Consolas" panose="020B0609020204030204" pitchFamily="49" charset="0"/>
+              </a:rPr>
+              <a:t>.</a:t>
+            </a:r>
+            <a:r>
+              <a:rPr lang="es-CO" sz="1800" dirty="0" err="1">
+                <a:solidFill>
+                  <a:srgbClr val="000000"/>
+                </a:solidFill>
+                <a:latin typeface="Consolas" panose="020B0609020204030204" pitchFamily="49" charset="0"/>
+              </a:rPr>
+              <a:t>artistaId</a:t>
+            </a:r>
+            <a:r>
+              <a:rPr lang="es-CO" sz="1800" dirty="0">
+                <a:solidFill>
+                  <a:srgbClr val="000000"/>
+                </a:solidFill>
+                <a:latin typeface="Consolas" panose="020B0609020204030204" pitchFamily="49" charset="0"/>
+              </a:rPr>
+              <a:t> </a:t>
+            </a:r>
+            <a:r>
+              <a:rPr lang="es-CO" sz="1800" dirty="0">
+                <a:solidFill>
+                  <a:srgbClr val="808080"/>
+                </a:solidFill>
+                <a:latin typeface="Consolas" panose="020B0609020204030204" pitchFamily="49" charset="0"/>
+              </a:rPr>
+              <a:t>=</a:t>
+            </a:r>
+            <a:r>
+              <a:rPr lang="es-CO" sz="1800" dirty="0">
+                <a:solidFill>
+                  <a:srgbClr val="000000"/>
+                </a:solidFill>
+                <a:latin typeface="Consolas" panose="020B0609020204030204" pitchFamily="49" charset="0"/>
+              </a:rPr>
+              <a:t> </a:t>
+            </a:r>
+            <a:r>
+              <a:rPr lang="es-CO" sz="1800" dirty="0" err="1">
+                <a:solidFill>
+                  <a:srgbClr val="000000"/>
+                </a:solidFill>
+                <a:latin typeface="Consolas" panose="020B0609020204030204" pitchFamily="49" charset="0"/>
+              </a:rPr>
+              <a:t>c</a:t>
+            </a:r>
+            <a:r>
+              <a:rPr lang="es-CO" sz="1800" dirty="0" err="1">
+                <a:solidFill>
+                  <a:srgbClr val="808080"/>
+                </a:solidFill>
+                <a:latin typeface="Consolas" panose="020B0609020204030204" pitchFamily="49" charset="0"/>
+              </a:rPr>
+              <a:t>.</a:t>
+            </a:r>
+            <a:r>
+              <a:rPr lang="es-CO" sz="1800" dirty="0" err="1">
+                <a:solidFill>
+                  <a:srgbClr val="000000"/>
+                </a:solidFill>
+                <a:latin typeface="Consolas" panose="020B0609020204030204" pitchFamily="49" charset="0"/>
+              </a:rPr>
+              <a:t>artistaPrincipalId</a:t>
+            </a:r>
+            <a:r>
+              <a:rPr lang="es-CO" sz="1800" dirty="0">
+                <a:solidFill>
+                  <a:srgbClr val="000000"/>
+                </a:solidFill>
+                <a:latin typeface="Consolas" panose="020B0609020204030204" pitchFamily="49" charset="0"/>
+              </a:rPr>
+              <a:t> </a:t>
+            </a:r>
+          </a:p>
+          <a:p>
+            <a:r>
+              <a:rPr lang="en-US" sz="1800" dirty="0">
+                <a:solidFill>
+                  <a:srgbClr val="000000"/>
+                </a:solidFill>
+                <a:latin typeface="Consolas" panose="020B0609020204030204" pitchFamily="49" charset="0"/>
+              </a:rPr>
+              <a:t>    </a:t>
+            </a:r>
+            <a:r>
+              <a:rPr lang="en-US" sz="1800" dirty="0">
+                <a:solidFill>
+                  <a:srgbClr val="0000FF"/>
+                </a:solidFill>
+                <a:latin typeface="Consolas" panose="020B0609020204030204" pitchFamily="49" charset="0"/>
+              </a:rPr>
+              <a:t>WHERE</a:t>
+            </a:r>
+            <a:r>
+              <a:rPr lang="en-US" sz="1800" dirty="0">
+                <a:solidFill>
+                  <a:srgbClr val="000000"/>
+                </a:solidFill>
+                <a:latin typeface="Consolas" panose="020B0609020204030204" pitchFamily="49" charset="0"/>
+              </a:rPr>
+              <a:t> </a:t>
+            </a:r>
+            <a:r>
+              <a:rPr lang="en-US" sz="1800" dirty="0" err="1">
+                <a:solidFill>
+                  <a:srgbClr val="000000"/>
+                </a:solidFill>
+                <a:latin typeface="Consolas" panose="020B0609020204030204" pitchFamily="49" charset="0"/>
+              </a:rPr>
+              <a:t>a</a:t>
+            </a:r>
+            <a:r>
+              <a:rPr lang="en-US" sz="1800" dirty="0" err="1">
+                <a:solidFill>
+                  <a:srgbClr val="808080"/>
+                </a:solidFill>
+                <a:latin typeface="Consolas" panose="020B0609020204030204" pitchFamily="49" charset="0"/>
+              </a:rPr>
+              <a:t>.</a:t>
+            </a:r>
+            <a:r>
+              <a:rPr lang="en-US" sz="1800" dirty="0" err="1">
+                <a:solidFill>
+                  <a:srgbClr val="000000"/>
+                </a:solidFill>
+                <a:latin typeface="Consolas" panose="020B0609020204030204" pitchFamily="49" charset="0"/>
+              </a:rPr>
+              <a:t>nombre</a:t>
+            </a:r>
+            <a:r>
+              <a:rPr lang="en-US" sz="1800" dirty="0">
+                <a:solidFill>
+                  <a:srgbClr val="000000"/>
+                </a:solidFill>
+                <a:latin typeface="Consolas" panose="020B0609020204030204" pitchFamily="49" charset="0"/>
+              </a:rPr>
+              <a:t> </a:t>
+            </a:r>
+            <a:r>
+              <a:rPr lang="en-US" sz="1800" dirty="0">
+                <a:solidFill>
+                  <a:srgbClr val="808080"/>
+                </a:solidFill>
+                <a:latin typeface="Consolas" panose="020B0609020204030204" pitchFamily="49" charset="0"/>
+              </a:rPr>
+              <a:t>=</a:t>
+            </a:r>
+            <a:r>
+              <a:rPr lang="en-US" sz="1800" dirty="0">
+                <a:solidFill>
+                  <a:srgbClr val="000000"/>
+                </a:solidFill>
+                <a:latin typeface="Consolas" panose="020B0609020204030204" pitchFamily="49" charset="0"/>
+              </a:rPr>
+              <a:t> </a:t>
+            </a:r>
+            <a:r>
+              <a:rPr lang="en-US" sz="1800" dirty="0">
+                <a:solidFill>
+                  <a:srgbClr val="FF0000"/>
+                </a:solidFill>
+                <a:latin typeface="Consolas" panose="020B0609020204030204" pitchFamily="49" charset="0"/>
+              </a:rPr>
+              <a:t>'Taylor Swift'</a:t>
+            </a:r>
+            <a:endParaRPr lang="en-US" sz="1800" dirty="0">
+              <a:solidFill>
+                <a:srgbClr val="000000"/>
+              </a:solidFill>
+              <a:latin typeface="Consolas" panose="020B0609020204030204" pitchFamily="49" charset="0"/>
+            </a:endParaRPr>
+          </a:p>
+          <a:p>
+            <a:r>
+              <a:rPr lang="es-CO" sz="1800" dirty="0">
+                <a:solidFill>
+                  <a:srgbClr val="808080"/>
+                </a:solidFill>
+                <a:latin typeface="Consolas" panose="020B0609020204030204" pitchFamily="49" charset="0"/>
+              </a:rPr>
+              <a:t>);</a:t>
+            </a:r>
+            <a:endParaRPr lang="es-CO" sz="2000" dirty="0">
+              <a:solidFill>
+                <a:srgbClr val="008000"/>
+              </a:solidFill>
+              <a:latin typeface="Consolas" panose="020B0609020204030204" pitchFamily="49" charset="0"/>
+            </a:endParaRPr>
+          </a:p>
+        </p:txBody>
+      </p:sp>
+    </p:spTree>
+    <p:extLst>
+      <p:ext uri="{BB962C8B-B14F-4D97-AF65-F5344CB8AC3E}">
+        <p14:creationId xmlns:p14="http://schemas.microsoft.com/office/powerpoint/2010/main" val="1877543194"/>
+      </p:ext>
+    </p:extLst>
+  </p:cSld>
+  <p:clrMapOvr>
+    <a:masterClrMapping/>
+  </p:clrMapOvr>
+</p:sld>
+</file>
+
+<file path=ppt/slides/slide24.xml><?xml version="1.0" encoding="utf-8"?>
+<p:sld xmlns:a="http://schemas.openxmlformats.org/drawingml/2006/main" xmlns:r="http://schemas.openxmlformats.org/officeDocument/2006/relationships" xmlns:p="http://schemas.openxmlformats.org/presentationml/2006/main">
+  <p:cSld>
+    <p:spTree>
+      <p:nvGrpSpPr>
+        <p:cNvPr id="1" name=""/>
+        <p:cNvGrpSpPr/>
+        <p:nvPr/>
+      </p:nvGrpSpPr>
+      <p:grpSpPr>
+        <a:xfrm>
+          <a:off x="0" y="0"/>
+          <a:ext cx="0" cy="0"/>
+          <a:chOff x="0" y="0"/>
+          <a:chExt cx="0" cy="0"/>
+        </a:xfrm>
+      </p:grpSpPr>
+      <p:sp>
+        <p:nvSpPr>
+          <p:cNvPr id="2" name="Título 1">
+            <a:extLst>
+              <a:ext uri="{FF2B5EF4-FFF2-40B4-BE49-F238E27FC236}">
+                <a16:creationId xmlns:a16="http://schemas.microsoft.com/office/drawing/2014/main" id="{F850D9D6-A2BA-D73A-E3A6-82632A78533D}"/>
+              </a:ext>
+            </a:extLst>
+          </p:cNvPr>
+          <p:cNvSpPr>
+            <a:spLocks noGrp="1"/>
+          </p:cNvSpPr>
+          <p:nvPr>
+            <p:ph type="title"/>
+          </p:nvPr>
+        </p:nvSpPr>
+        <p:spPr/>
+        <p:txBody>
+          <a:bodyPr/>
+          <a:lstStyle/>
+          <a:p>
+            <a:endParaRPr lang="es-CO"/>
+          </a:p>
+        </p:txBody>
+      </p:sp>
+      <p:sp>
+        <p:nvSpPr>
+          <p:cNvPr id="3" name="Marcador de contenido 2">
+            <a:extLst>
+              <a:ext uri="{FF2B5EF4-FFF2-40B4-BE49-F238E27FC236}">
+                <a16:creationId xmlns:a16="http://schemas.microsoft.com/office/drawing/2014/main" id="{A79AC125-C7EC-93D3-5053-897C1B7E03BE}"/>
+              </a:ext>
+            </a:extLst>
+          </p:cNvPr>
+          <p:cNvSpPr>
+            <a:spLocks noGrp="1"/>
+          </p:cNvSpPr>
+          <p:nvPr>
+            <p:ph idx="1"/>
+          </p:nvPr>
+        </p:nvSpPr>
+        <p:spPr/>
+        <p:txBody>
+          <a:bodyPr/>
+          <a:lstStyle/>
+          <a:p>
+            <a:r>
+              <a:rPr lang="es-CO" b="0" i="1" dirty="0">
+                <a:solidFill>
+                  <a:srgbClr val="6D6D6D"/>
+                </a:solidFill>
+                <a:effectLst/>
+                <a:latin typeface="Consolas" panose="020B0609020204030204" pitchFamily="49" charset="0"/>
+              </a:rPr>
+              <a:t>-- 2. Artistas con conciertos más caros que cualquier concierto de Taylor Swift</a:t>
+            </a:r>
+            <a:endParaRPr lang="es-CO" b="0" dirty="0">
+              <a:solidFill>
+                <a:srgbClr val="D6D6DD"/>
+              </a:solidFill>
+              <a:effectLst/>
+              <a:latin typeface="Consolas" panose="020B0609020204030204" pitchFamily="49" charset="0"/>
+            </a:endParaRPr>
+          </a:p>
+          <a:p>
+            <a:endParaRPr lang="es-CO" dirty="0"/>
+          </a:p>
+        </p:txBody>
+      </p:sp>
+    </p:spTree>
+    <p:extLst>
+      <p:ext uri="{BB962C8B-B14F-4D97-AF65-F5344CB8AC3E}">
+        <p14:creationId xmlns:p14="http://schemas.microsoft.com/office/powerpoint/2010/main" val="3640573840"/>
+      </p:ext>
+    </p:extLst>
+  </p:cSld>
+  <p:clrMapOvr>
+    <a:masterClrMapping/>
+  </p:clrMapOvr>
+</p:sld>
+</file>
+
+<file path=ppt/slides/slide25.xml><?xml version="1.0" encoding="utf-8"?>
+<p:sld xmlns:a="http://schemas.openxmlformats.org/drawingml/2006/main" xmlns:r="http://schemas.openxmlformats.org/officeDocument/2006/relationships" xmlns:p="http://schemas.openxmlformats.org/presentationml/2006/main">
+  <p:cSld>
+    <p:spTree>
+      <p:nvGrpSpPr>
+        <p:cNvPr id="1" name="">
+          <a:extLst>
+            <a:ext uri="{FF2B5EF4-FFF2-40B4-BE49-F238E27FC236}">
+              <a16:creationId xmlns:a16="http://schemas.microsoft.com/office/drawing/2014/main" id="{E54F24F5-4042-DF3B-3D8A-507A2AB7F119}"/>
+            </a:ext>
+          </a:extLst>
+        </p:cNvPr>
+        <p:cNvGrpSpPr/>
+        <p:nvPr/>
+      </p:nvGrpSpPr>
+      <p:grpSpPr>
+        <a:xfrm>
+          <a:off x="0" y="0"/>
+          <a:ext cx="0" cy="0"/>
+          <a:chOff x="0" y="0"/>
+          <a:chExt cx="0" cy="0"/>
+        </a:xfrm>
+      </p:grpSpPr>
+      <p:sp>
+        <p:nvSpPr>
+          <p:cNvPr id="2" name="CuadroTexto 1">
+            <a:extLst>
+              <a:ext uri="{FF2B5EF4-FFF2-40B4-BE49-F238E27FC236}">
+                <a16:creationId xmlns:a16="http://schemas.microsoft.com/office/drawing/2014/main" id="{345917B1-16AC-9C8A-D256-6F2B35B9E256}"/>
+              </a:ext>
+            </a:extLst>
+          </p:cNvPr>
+          <p:cNvSpPr txBox="1"/>
+          <p:nvPr/>
+        </p:nvSpPr>
+        <p:spPr>
+          <a:xfrm>
+            <a:off x="1702311" y="191593"/>
+            <a:ext cx="8787407" cy="707886"/>
+          </a:xfrm>
+          <a:prstGeom prst="rect">
+            <a:avLst/>
+          </a:prstGeom>
+          <a:noFill/>
+        </p:spPr>
+        <p:txBody>
+          <a:bodyPr wrap="none" rtlCol="0">
+            <a:spAutoFit/>
+          </a:bodyPr>
+          <a:lstStyle/>
+          <a:p>
+            <a:pPr algn="ctr"/>
+            <a:r>
+              <a:rPr lang="es-CO" sz="4000" b="1" dirty="0"/>
+              <a:t>COMMON TABLE EXPRESSIONS - CTE</a:t>
+            </a:r>
+          </a:p>
+        </p:txBody>
+      </p:sp>
+      <p:sp>
+        <p:nvSpPr>
+          <p:cNvPr id="3" name="CuadroTexto 2">
+            <a:extLst>
+              <a:ext uri="{FF2B5EF4-FFF2-40B4-BE49-F238E27FC236}">
+                <a16:creationId xmlns:a16="http://schemas.microsoft.com/office/drawing/2014/main" id="{3EE7E0D7-5720-6638-F1F5-72C0F080DC2C}"/>
+              </a:ext>
+            </a:extLst>
+          </p:cNvPr>
+          <p:cNvSpPr txBox="1"/>
+          <p:nvPr/>
+        </p:nvSpPr>
+        <p:spPr>
+          <a:xfrm>
+            <a:off x="2026920" y="1744732"/>
+            <a:ext cx="8138160" cy="2923877"/>
+          </a:xfrm>
+          <a:prstGeom prst="rect">
+            <a:avLst/>
+          </a:prstGeom>
+          <a:noFill/>
+        </p:spPr>
+        <p:txBody>
+          <a:bodyPr wrap="square">
+            <a:spAutoFit/>
+          </a:bodyPr>
+          <a:lstStyle/>
+          <a:p>
+            <a:r>
+              <a:rPr lang="es-CO" sz="2000" dirty="0">
+                <a:solidFill>
+                  <a:srgbClr val="008000"/>
+                </a:solidFill>
+                <a:latin typeface="Consolas" panose="020B0609020204030204" pitchFamily="49" charset="0"/>
+              </a:rPr>
+              <a:t>Encontrar artistas que tienen conciertos con precio superior al promedio</a:t>
+            </a:r>
+            <a:endParaRPr lang="es-CO" sz="2000" dirty="0">
+              <a:solidFill>
+                <a:srgbClr val="000000"/>
+              </a:solidFill>
+              <a:latin typeface="Consolas" panose="020B0609020204030204" pitchFamily="49" charset="0"/>
+            </a:endParaRPr>
+          </a:p>
+          <a:p>
+            <a:r>
+              <a:rPr lang="es-CO" sz="1800" dirty="0">
+                <a:solidFill>
+                  <a:srgbClr val="0000FF"/>
+                </a:solidFill>
+                <a:latin typeface="Consolas" panose="020B0609020204030204" pitchFamily="49" charset="0"/>
+              </a:rPr>
+              <a:t>WITH</a:t>
+            </a:r>
+            <a:r>
+              <a:rPr lang="es-CO" sz="1800" dirty="0">
+                <a:solidFill>
+                  <a:srgbClr val="000000"/>
+                </a:solidFill>
+                <a:latin typeface="Consolas" panose="020B0609020204030204" pitchFamily="49" charset="0"/>
+              </a:rPr>
+              <a:t> </a:t>
+            </a:r>
+            <a:r>
+              <a:rPr lang="es-CO" sz="1800" dirty="0" err="1">
+                <a:solidFill>
+                  <a:srgbClr val="000000"/>
+                </a:solidFill>
+                <a:latin typeface="Consolas" panose="020B0609020204030204" pitchFamily="49" charset="0"/>
+              </a:rPr>
+              <a:t>precioPromedio</a:t>
+            </a:r>
+            <a:r>
+              <a:rPr lang="es-CO" sz="1800" dirty="0">
+                <a:solidFill>
+                  <a:srgbClr val="000000"/>
+                </a:solidFill>
+                <a:latin typeface="Consolas" panose="020B0609020204030204" pitchFamily="49" charset="0"/>
+              </a:rPr>
+              <a:t> </a:t>
+            </a:r>
+            <a:r>
+              <a:rPr lang="es-CO" sz="1800" dirty="0">
+                <a:solidFill>
+                  <a:srgbClr val="0000FF"/>
+                </a:solidFill>
+                <a:latin typeface="Consolas" panose="020B0609020204030204" pitchFamily="49" charset="0"/>
+              </a:rPr>
+              <a:t>as </a:t>
+            </a:r>
+            <a:r>
+              <a:rPr lang="es-CO" sz="1800" dirty="0">
+                <a:solidFill>
+                  <a:srgbClr val="808080"/>
+                </a:solidFill>
+                <a:latin typeface="Consolas" panose="020B0609020204030204" pitchFamily="49" charset="0"/>
+              </a:rPr>
+              <a:t>(</a:t>
+            </a:r>
+            <a:endParaRPr lang="es-CO" sz="1800" dirty="0">
+              <a:solidFill>
+                <a:srgbClr val="000000"/>
+              </a:solidFill>
+              <a:latin typeface="Consolas" panose="020B0609020204030204" pitchFamily="49" charset="0"/>
+            </a:endParaRPr>
+          </a:p>
+          <a:p>
+            <a:r>
+              <a:rPr lang="en-US" sz="1800" dirty="0">
+                <a:solidFill>
+                  <a:srgbClr val="0000FF"/>
+                </a:solidFill>
+                <a:latin typeface="Consolas" panose="020B0609020204030204" pitchFamily="49" charset="0"/>
+              </a:rPr>
+              <a:t>SELECT</a:t>
+            </a:r>
+            <a:r>
+              <a:rPr lang="en-US" sz="1800" dirty="0">
+                <a:solidFill>
+                  <a:srgbClr val="000000"/>
+                </a:solidFill>
+                <a:latin typeface="Consolas" panose="020B0609020204030204" pitchFamily="49" charset="0"/>
+              </a:rPr>
+              <a:t> </a:t>
+            </a:r>
+            <a:r>
+              <a:rPr lang="en-US" sz="1800" dirty="0">
+                <a:solidFill>
+                  <a:srgbClr val="FF00FF"/>
+                </a:solidFill>
+                <a:latin typeface="Consolas" panose="020B0609020204030204" pitchFamily="49" charset="0"/>
+              </a:rPr>
+              <a:t>AVG</a:t>
+            </a:r>
+            <a:r>
+              <a:rPr lang="en-US" sz="1800" dirty="0">
+                <a:solidFill>
+                  <a:srgbClr val="808080"/>
+                </a:solidFill>
+                <a:latin typeface="Consolas" panose="020B0609020204030204" pitchFamily="49" charset="0"/>
+              </a:rPr>
+              <a:t>(</a:t>
+            </a:r>
+            <a:r>
+              <a:rPr lang="en-US" sz="1800" dirty="0" err="1">
+                <a:solidFill>
+                  <a:srgbClr val="000000"/>
+                </a:solidFill>
+                <a:latin typeface="Consolas" panose="020B0609020204030204" pitchFamily="49" charset="0"/>
+              </a:rPr>
+              <a:t>precioBase</a:t>
+            </a:r>
+            <a:r>
+              <a:rPr lang="en-US" sz="1800" dirty="0">
+                <a:solidFill>
+                  <a:srgbClr val="808080"/>
+                </a:solidFill>
+                <a:latin typeface="Consolas" panose="020B0609020204030204" pitchFamily="49" charset="0"/>
+              </a:rPr>
+              <a:t>)</a:t>
+            </a:r>
+            <a:r>
+              <a:rPr lang="en-US" sz="1800" dirty="0">
+                <a:solidFill>
+                  <a:srgbClr val="000000"/>
+                </a:solidFill>
+                <a:latin typeface="Consolas" panose="020B0609020204030204" pitchFamily="49" charset="0"/>
+              </a:rPr>
+              <a:t> </a:t>
+            </a:r>
+            <a:r>
+              <a:rPr lang="en-US" sz="1800" dirty="0">
+                <a:solidFill>
+                  <a:srgbClr val="0000FF"/>
+                </a:solidFill>
+                <a:latin typeface="Consolas" panose="020B0609020204030204" pitchFamily="49" charset="0"/>
+              </a:rPr>
+              <a:t>AS</a:t>
+            </a:r>
+            <a:r>
+              <a:rPr lang="en-US" sz="1800" dirty="0">
+                <a:solidFill>
+                  <a:srgbClr val="000000"/>
+                </a:solidFill>
+                <a:latin typeface="Consolas" panose="020B0609020204030204" pitchFamily="49" charset="0"/>
+              </a:rPr>
+              <a:t> PROM</a:t>
+            </a:r>
+          </a:p>
+          <a:p>
+            <a:r>
+              <a:rPr lang="es-CO" sz="1800" dirty="0">
+                <a:solidFill>
+                  <a:srgbClr val="0000FF"/>
+                </a:solidFill>
+                <a:latin typeface="Consolas" panose="020B0609020204030204" pitchFamily="49" charset="0"/>
+              </a:rPr>
+              <a:t>FROM</a:t>
+            </a:r>
+            <a:r>
+              <a:rPr lang="es-CO" sz="1800" dirty="0">
+                <a:solidFill>
+                  <a:srgbClr val="000000"/>
+                </a:solidFill>
+                <a:latin typeface="Consolas" panose="020B0609020204030204" pitchFamily="49" charset="0"/>
+              </a:rPr>
+              <a:t> Concierto</a:t>
+            </a:r>
+          </a:p>
+          <a:p>
+            <a:r>
+              <a:rPr lang="es-CO" sz="1800" dirty="0">
+                <a:solidFill>
+                  <a:srgbClr val="808080"/>
+                </a:solidFill>
+                <a:latin typeface="Consolas" panose="020B0609020204030204" pitchFamily="49" charset="0"/>
+              </a:rPr>
+              <a:t>)</a:t>
+            </a:r>
+            <a:endParaRPr lang="es-CO" sz="1800" dirty="0">
+              <a:solidFill>
+                <a:srgbClr val="000000"/>
+              </a:solidFill>
+              <a:latin typeface="Consolas" panose="020B0609020204030204" pitchFamily="49" charset="0"/>
+            </a:endParaRPr>
+          </a:p>
+          <a:p>
+            <a:r>
+              <a:rPr lang="es-CO" sz="1800" dirty="0">
+                <a:solidFill>
+                  <a:srgbClr val="0000FF"/>
+                </a:solidFill>
+                <a:latin typeface="Consolas" panose="020B0609020204030204" pitchFamily="49" charset="0"/>
+              </a:rPr>
+              <a:t>SELECT</a:t>
+            </a:r>
+            <a:r>
+              <a:rPr lang="es-CO" sz="1800" dirty="0">
+                <a:solidFill>
+                  <a:srgbClr val="000000"/>
+                </a:solidFill>
+                <a:latin typeface="Consolas" panose="020B0609020204030204" pitchFamily="49" charset="0"/>
+              </a:rPr>
+              <a:t> </a:t>
+            </a:r>
+            <a:r>
+              <a:rPr lang="es-CO" sz="1800" dirty="0">
+                <a:solidFill>
+                  <a:srgbClr val="0000FF"/>
+                </a:solidFill>
+                <a:latin typeface="Consolas" panose="020B0609020204030204" pitchFamily="49" charset="0"/>
+              </a:rPr>
+              <a:t>DISTINCT</a:t>
+            </a:r>
+            <a:r>
+              <a:rPr lang="es-CO" sz="1800" dirty="0">
+                <a:solidFill>
+                  <a:srgbClr val="000000"/>
+                </a:solidFill>
+                <a:latin typeface="Consolas" panose="020B0609020204030204" pitchFamily="49" charset="0"/>
+              </a:rPr>
+              <a:t> </a:t>
+            </a:r>
+            <a:r>
+              <a:rPr lang="es-CO" sz="1800" dirty="0" err="1">
+                <a:solidFill>
+                  <a:srgbClr val="000000"/>
+                </a:solidFill>
+                <a:latin typeface="Consolas" panose="020B0609020204030204" pitchFamily="49" charset="0"/>
+              </a:rPr>
+              <a:t>a</a:t>
+            </a:r>
+            <a:r>
+              <a:rPr lang="es-CO" sz="1800" dirty="0" err="1">
+                <a:solidFill>
+                  <a:srgbClr val="808080"/>
+                </a:solidFill>
+                <a:latin typeface="Consolas" panose="020B0609020204030204" pitchFamily="49" charset="0"/>
+              </a:rPr>
+              <a:t>.</a:t>
+            </a:r>
+            <a:r>
+              <a:rPr lang="es-CO" sz="1800" dirty="0" err="1">
+                <a:solidFill>
+                  <a:srgbClr val="000000"/>
+                </a:solidFill>
+                <a:latin typeface="Consolas" panose="020B0609020204030204" pitchFamily="49" charset="0"/>
+              </a:rPr>
+              <a:t>nombre</a:t>
+            </a:r>
+            <a:r>
+              <a:rPr lang="es-CO" sz="1800" dirty="0">
+                <a:solidFill>
+                  <a:srgbClr val="808080"/>
+                </a:solidFill>
+                <a:latin typeface="Consolas" panose="020B0609020204030204" pitchFamily="49" charset="0"/>
+              </a:rPr>
+              <a:t>,</a:t>
+            </a:r>
+            <a:r>
+              <a:rPr lang="es-CO" sz="1800" dirty="0">
+                <a:solidFill>
+                  <a:srgbClr val="000000"/>
+                </a:solidFill>
+                <a:latin typeface="Consolas" panose="020B0609020204030204" pitchFamily="49" charset="0"/>
+              </a:rPr>
+              <a:t> </a:t>
+            </a:r>
+            <a:r>
+              <a:rPr lang="es-CO" sz="1800" dirty="0" err="1">
+                <a:solidFill>
+                  <a:srgbClr val="000000"/>
+                </a:solidFill>
+                <a:latin typeface="Consolas" panose="020B0609020204030204" pitchFamily="49" charset="0"/>
+              </a:rPr>
+              <a:t>c</a:t>
+            </a:r>
+            <a:r>
+              <a:rPr lang="es-CO" sz="1800" dirty="0" err="1">
+                <a:solidFill>
+                  <a:srgbClr val="808080"/>
+                </a:solidFill>
+                <a:latin typeface="Consolas" panose="020B0609020204030204" pitchFamily="49" charset="0"/>
+              </a:rPr>
+              <a:t>.</a:t>
+            </a:r>
+            <a:r>
+              <a:rPr lang="es-CO" sz="1800" dirty="0" err="1">
+                <a:solidFill>
+                  <a:srgbClr val="000000"/>
+                </a:solidFill>
+                <a:latin typeface="Consolas" panose="020B0609020204030204" pitchFamily="49" charset="0"/>
+              </a:rPr>
+              <a:t>precioBase</a:t>
+            </a:r>
+            <a:endParaRPr lang="es-CO" sz="1800" dirty="0">
+              <a:solidFill>
+                <a:srgbClr val="000000"/>
+              </a:solidFill>
+              <a:latin typeface="Consolas" panose="020B0609020204030204" pitchFamily="49" charset="0"/>
+            </a:endParaRPr>
+          </a:p>
+          <a:p>
+            <a:r>
+              <a:rPr lang="es-CO" sz="1800" dirty="0">
+                <a:solidFill>
+                  <a:srgbClr val="0000FF"/>
+                </a:solidFill>
+                <a:latin typeface="Consolas" panose="020B0609020204030204" pitchFamily="49" charset="0"/>
+              </a:rPr>
+              <a:t>FROM</a:t>
+            </a:r>
+            <a:r>
+              <a:rPr lang="es-CO" sz="1800" dirty="0">
+                <a:solidFill>
+                  <a:srgbClr val="000000"/>
+                </a:solidFill>
+                <a:latin typeface="Consolas" panose="020B0609020204030204" pitchFamily="49" charset="0"/>
+              </a:rPr>
+              <a:t> Artista a</a:t>
+            </a:r>
+          </a:p>
+          <a:p>
+            <a:r>
+              <a:rPr lang="fr-FR" sz="1800" dirty="0">
+                <a:solidFill>
+                  <a:srgbClr val="808080"/>
+                </a:solidFill>
+                <a:latin typeface="Consolas" panose="020B0609020204030204" pitchFamily="49" charset="0"/>
+              </a:rPr>
+              <a:t>JOIN</a:t>
+            </a:r>
+            <a:r>
+              <a:rPr lang="fr-FR" sz="1800" dirty="0">
+                <a:solidFill>
+                  <a:srgbClr val="000000"/>
+                </a:solidFill>
+                <a:latin typeface="Consolas" panose="020B0609020204030204" pitchFamily="49" charset="0"/>
+              </a:rPr>
+              <a:t> </a:t>
+            </a:r>
+            <a:r>
+              <a:rPr lang="fr-FR" sz="1800" dirty="0" err="1">
+                <a:solidFill>
+                  <a:srgbClr val="000000"/>
+                </a:solidFill>
+                <a:latin typeface="Consolas" panose="020B0609020204030204" pitchFamily="49" charset="0"/>
+              </a:rPr>
+              <a:t>Concierto</a:t>
+            </a:r>
+            <a:r>
+              <a:rPr lang="fr-FR" sz="1800" dirty="0">
+                <a:solidFill>
+                  <a:srgbClr val="000000"/>
+                </a:solidFill>
+                <a:latin typeface="Consolas" panose="020B0609020204030204" pitchFamily="49" charset="0"/>
+              </a:rPr>
+              <a:t> c </a:t>
+            </a:r>
+            <a:r>
+              <a:rPr lang="fr-FR" sz="1800" dirty="0">
+                <a:solidFill>
+                  <a:srgbClr val="0000FF"/>
+                </a:solidFill>
+                <a:latin typeface="Consolas" panose="020B0609020204030204" pitchFamily="49" charset="0"/>
+              </a:rPr>
+              <a:t>ON</a:t>
+            </a:r>
+            <a:r>
+              <a:rPr lang="fr-FR" sz="1800" dirty="0">
+                <a:solidFill>
+                  <a:srgbClr val="000000"/>
+                </a:solidFill>
+                <a:latin typeface="Consolas" panose="020B0609020204030204" pitchFamily="49" charset="0"/>
+              </a:rPr>
+              <a:t> </a:t>
+            </a:r>
+            <a:r>
+              <a:rPr lang="fr-FR" sz="1800" dirty="0" err="1">
+                <a:solidFill>
+                  <a:srgbClr val="000000"/>
+                </a:solidFill>
+                <a:latin typeface="Consolas" panose="020B0609020204030204" pitchFamily="49" charset="0"/>
+              </a:rPr>
+              <a:t>a</a:t>
+            </a:r>
+            <a:r>
+              <a:rPr lang="fr-FR" sz="1800" dirty="0" err="1">
+                <a:solidFill>
+                  <a:srgbClr val="808080"/>
+                </a:solidFill>
+                <a:latin typeface="Consolas" panose="020B0609020204030204" pitchFamily="49" charset="0"/>
+              </a:rPr>
+              <a:t>.</a:t>
+            </a:r>
+            <a:r>
+              <a:rPr lang="fr-FR" sz="1800" dirty="0" err="1">
+                <a:solidFill>
+                  <a:srgbClr val="000000"/>
+                </a:solidFill>
+                <a:latin typeface="Consolas" panose="020B0609020204030204" pitchFamily="49" charset="0"/>
+              </a:rPr>
+              <a:t>artistaId</a:t>
+            </a:r>
+            <a:r>
+              <a:rPr lang="fr-FR" sz="1800" dirty="0">
+                <a:solidFill>
+                  <a:srgbClr val="000000"/>
+                </a:solidFill>
+                <a:latin typeface="Consolas" panose="020B0609020204030204" pitchFamily="49" charset="0"/>
+              </a:rPr>
+              <a:t> </a:t>
+            </a:r>
+            <a:r>
+              <a:rPr lang="fr-FR" sz="1800" dirty="0">
+                <a:solidFill>
+                  <a:srgbClr val="808080"/>
+                </a:solidFill>
+                <a:latin typeface="Consolas" panose="020B0609020204030204" pitchFamily="49" charset="0"/>
+              </a:rPr>
+              <a:t>=</a:t>
+            </a:r>
+            <a:r>
+              <a:rPr lang="fr-FR" sz="1800" dirty="0">
+                <a:solidFill>
+                  <a:srgbClr val="000000"/>
+                </a:solidFill>
+                <a:latin typeface="Consolas" panose="020B0609020204030204" pitchFamily="49" charset="0"/>
+              </a:rPr>
+              <a:t> </a:t>
+            </a:r>
+            <a:r>
+              <a:rPr lang="fr-FR" sz="1800" dirty="0" err="1">
+                <a:solidFill>
+                  <a:srgbClr val="000000"/>
+                </a:solidFill>
+                <a:latin typeface="Consolas" panose="020B0609020204030204" pitchFamily="49" charset="0"/>
+              </a:rPr>
+              <a:t>c</a:t>
+            </a:r>
+            <a:r>
+              <a:rPr lang="fr-FR" sz="1800" dirty="0" err="1">
+                <a:solidFill>
+                  <a:srgbClr val="808080"/>
+                </a:solidFill>
+                <a:latin typeface="Consolas" panose="020B0609020204030204" pitchFamily="49" charset="0"/>
+              </a:rPr>
+              <a:t>.</a:t>
+            </a:r>
+            <a:r>
+              <a:rPr lang="fr-FR" sz="1800" dirty="0" err="1">
+                <a:solidFill>
+                  <a:srgbClr val="000000"/>
+                </a:solidFill>
+                <a:latin typeface="Consolas" panose="020B0609020204030204" pitchFamily="49" charset="0"/>
+              </a:rPr>
+              <a:t>artistaPrincipalId</a:t>
+            </a:r>
+            <a:endParaRPr lang="fr-FR" sz="1800" dirty="0">
+              <a:solidFill>
+                <a:srgbClr val="000000"/>
+              </a:solidFill>
+              <a:latin typeface="Consolas" panose="020B0609020204030204" pitchFamily="49" charset="0"/>
+            </a:endParaRPr>
+          </a:p>
+          <a:p>
+            <a:r>
+              <a:rPr lang="en-US" sz="1800" dirty="0">
+                <a:solidFill>
+                  <a:srgbClr val="0000FF"/>
+                </a:solidFill>
+                <a:latin typeface="Consolas" panose="020B0609020204030204" pitchFamily="49" charset="0"/>
+              </a:rPr>
+              <a:t>WHERE</a:t>
+            </a:r>
+            <a:r>
+              <a:rPr lang="en-US" sz="1800" dirty="0">
+                <a:solidFill>
+                  <a:srgbClr val="000000"/>
+                </a:solidFill>
+                <a:latin typeface="Consolas" panose="020B0609020204030204" pitchFamily="49" charset="0"/>
+              </a:rPr>
+              <a:t> </a:t>
+            </a:r>
+            <a:r>
+              <a:rPr lang="en-US" sz="1800" dirty="0" err="1">
+                <a:solidFill>
+                  <a:srgbClr val="000000"/>
+                </a:solidFill>
+                <a:latin typeface="Consolas" panose="020B0609020204030204" pitchFamily="49" charset="0"/>
+              </a:rPr>
+              <a:t>c</a:t>
+            </a:r>
+            <a:r>
+              <a:rPr lang="en-US" sz="1800" dirty="0" err="1">
+                <a:solidFill>
+                  <a:srgbClr val="808080"/>
+                </a:solidFill>
+                <a:latin typeface="Consolas" panose="020B0609020204030204" pitchFamily="49" charset="0"/>
+              </a:rPr>
+              <a:t>.</a:t>
+            </a:r>
+            <a:r>
+              <a:rPr lang="en-US" sz="1800" dirty="0" err="1">
+                <a:solidFill>
+                  <a:srgbClr val="000000"/>
+                </a:solidFill>
+                <a:latin typeface="Consolas" panose="020B0609020204030204" pitchFamily="49" charset="0"/>
+              </a:rPr>
+              <a:t>precioBase</a:t>
+            </a:r>
+            <a:r>
+              <a:rPr lang="en-US" sz="1800" dirty="0">
+                <a:solidFill>
+                  <a:srgbClr val="000000"/>
+                </a:solidFill>
+                <a:latin typeface="Consolas" panose="020B0609020204030204" pitchFamily="49" charset="0"/>
+              </a:rPr>
+              <a:t> </a:t>
+            </a:r>
+            <a:r>
+              <a:rPr lang="en-US" sz="1800" dirty="0">
+                <a:solidFill>
+                  <a:srgbClr val="808080"/>
+                </a:solidFill>
+                <a:latin typeface="Consolas" panose="020B0609020204030204" pitchFamily="49" charset="0"/>
+              </a:rPr>
+              <a:t>&gt;</a:t>
+            </a:r>
+            <a:r>
+              <a:rPr lang="en-US" sz="1800" dirty="0">
+                <a:solidFill>
+                  <a:srgbClr val="0000FF"/>
+                </a:solidFill>
+                <a:latin typeface="Consolas" panose="020B0609020204030204" pitchFamily="49" charset="0"/>
+              </a:rPr>
+              <a:t> </a:t>
+            </a:r>
+            <a:r>
+              <a:rPr lang="en-US" sz="1800" dirty="0">
+                <a:solidFill>
+                  <a:srgbClr val="808080"/>
+                </a:solidFill>
+                <a:latin typeface="Consolas" panose="020B0609020204030204" pitchFamily="49" charset="0"/>
+              </a:rPr>
+              <a:t>(</a:t>
+            </a:r>
+            <a:r>
+              <a:rPr lang="en-US" sz="1800" dirty="0">
+                <a:solidFill>
+                  <a:srgbClr val="0000FF"/>
+                </a:solidFill>
+                <a:latin typeface="Consolas" panose="020B0609020204030204" pitchFamily="49" charset="0"/>
+              </a:rPr>
+              <a:t>select</a:t>
+            </a:r>
+            <a:r>
+              <a:rPr lang="en-US" sz="1800" dirty="0">
+                <a:solidFill>
+                  <a:srgbClr val="000000"/>
+                </a:solidFill>
+                <a:latin typeface="Consolas" panose="020B0609020204030204" pitchFamily="49" charset="0"/>
+              </a:rPr>
+              <a:t> prom </a:t>
+            </a:r>
+            <a:r>
+              <a:rPr lang="en-US" sz="1800" dirty="0">
+                <a:solidFill>
+                  <a:srgbClr val="0000FF"/>
+                </a:solidFill>
+                <a:latin typeface="Consolas" panose="020B0609020204030204" pitchFamily="49" charset="0"/>
+              </a:rPr>
+              <a:t>FROM</a:t>
+            </a:r>
+            <a:r>
+              <a:rPr lang="en-US" sz="1800" dirty="0">
+                <a:solidFill>
+                  <a:srgbClr val="000000"/>
+                </a:solidFill>
+                <a:latin typeface="Consolas" panose="020B0609020204030204" pitchFamily="49" charset="0"/>
+              </a:rPr>
+              <a:t> </a:t>
+            </a:r>
+            <a:r>
+              <a:rPr lang="en-US" sz="1800" dirty="0" err="1">
+                <a:solidFill>
+                  <a:srgbClr val="000000"/>
+                </a:solidFill>
+                <a:latin typeface="Consolas" panose="020B0609020204030204" pitchFamily="49" charset="0"/>
+              </a:rPr>
+              <a:t>precioPromedio</a:t>
+            </a:r>
+            <a:r>
+              <a:rPr lang="en-US" sz="1800" dirty="0">
+                <a:solidFill>
+                  <a:srgbClr val="808080"/>
+                </a:solidFill>
+                <a:latin typeface="Consolas" panose="020B0609020204030204" pitchFamily="49" charset="0"/>
+              </a:rPr>
+              <a:t>)</a:t>
+            </a:r>
+            <a:endParaRPr lang="es-CO" sz="3200" dirty="0"/>
+          </a:p>
+        </p:txBody>
+      </p:sp>
+    </p:spTree>
+    <p:extLst>
+      <p:ext uri="{BB962C8B-B14F-4D97-AF65-F5344CB8AC3E}">
+        <p14:creationId xmlns:p14="http://schemas.microsoft.com/office/powerpoint/2010/main" val="583016310"/>
+      </p:ext>
+    </p:extLst>
+  </p:cSld>
+  <p:clrMapOvr>
+    <a:masterClrMapping/>
+  </p:clrMapOvr>
+</p:sld>
+</file>
+
+<file path=ppt/slides/slide26.xml><?xml version="1.0" encoding="utf-8"?>
 <p:sld xmlns:a="http://schemas.openxmlformats.org/drawingml/2006/main" xmlns:r="http://schemas.openxmlformats.org/officeDocument/2006/relationships" xmlns:p="http://schemas.openxmlformats.org/presentationml/2006/main">
   <p:cSld>
     <p:bg>
@@ -9978,7 +11748,7 @@
 </p:sld>
 </file>
 
-<file path=ppt/slides/slide24.xml><?xml version="1.0" encoding="utf-8"?>
+<file path=ppt/slides/slide27.xml><?xml version="1.0" encoding="utf-8"?>
 <p:sld xmlns:a="http://schemas.openxmlformats.org/drawingml/2006/main" xmlns:r="http://schemas.openxmlformats.org/officeDocument/2006/relationships" xmlns:p="http://schemas.openxmlformats.org/presentationml/2006/main">
   <p:cSld>
     <p:bg>
@@ -11236,7 +13006,7 @@
                 </a:solidFill>
                 <a:latin typeface="Consolas" panose="020B0609020204030204" pitchFamily="49" charset="0"/>
               </a:rPr>
-              <a:t>lugarId</a:t>
+              <a:t>c.lugarId</a:t>
             </a:r>
             <a:r>
               <a:rPr lang="es-CO" sz="2800" dirty="0">
@@ -12192,6 +13962,17 @@
 </file>
 
 <file path=customXml/item1.xml><?xml version="1.0" encoding="utf-8"?>
+<p:properties xmlns:p="http://schemas.microsoft.com/office/2006/metadata/properties" xmlns:xsi="http://www.w3.org/2001/XMLSchema-instance" xmlns:pc="http://schemas.microsoft.com/office/infopath/2007/PartnerControls">
+  <documentManagement>
+    <TaxCatchAll xmlns="ef85bb3e-2804-46d3-905f-c22ca17669c2" xsi:nil="true"/>
+    <lcf76f155ced4ddcb4097134ff3c332f xmlns="28c133c1-f39f-47ef-88b0-6463f35cce5c">
+      <Terms xmlns="http://schemas.microsoft.com/office/infopath/2007/PartnerControls"/>
+    </lcf76f155ced4ddcb4097134ff3c332f>
+  </documentManagement>
+</p:properties>
+</file>
+
+<file path=customXml/item2.xml><?xml version="1.0" encoding="utf-8"?>
 <ct:contentTypeSchema xmlns:ct="http://schemas.microsoft.com/office/2006/metadata/contentType" xmlns:ma="http://schemas.microsoft.com/office/2006/metadata/properties/metaAttributes" ct:_="" ma:_="" ma:contentTypeName="Documento" ma:contentTypeID="0x010100DB1B367B95F05A46AD79F531E0B12249" ma:contentTypeVersion="18" ma:contentTypeDescription="Crear nuevo documento." ma:contentTypeScope="" ma:versionID="a5dceda80c3aefb9c7df26562547f51a">
   <xsd:schema xmlns:xsd="http://www.w3.org/2001/XMLSchema" xmlns:xs="http://www.w3.org/2001/XMLSchema" xmlns:p="http://schemas.microsoft.com/office/2006/metadata/properties" xmlns:ns2="28c133c1-f39f-47ef-88b0-6463f35cce5c" xmlns:ns3="ef85bb3e-2804-46d3-905f-c22ca17669c2" targetNamespace="http://schemas.microsoft.com/office/2006/metadata/properties" ma:root="true" ma:fieldsID="65af00da51a723e815f28c226d3c6b7e" ns2:_="" ns3:_="">
     <xsd:import namespace="28c133c1-f39f-47ef-88b0-6463f35cce5c"/>
@@ -12446,17 +14227,6 @@
 </ct:contentTypeSchema>
 </file>
 
-<file path=customXml/item2.xml><?xml version="1.0" encoding="utf-8"?>
-<p:properties xmlns:p="http://schemas.microsoft.com/office/2006/metadata/properties" xmlns:xsi="http://www.w3.org/2001/XMLSchema-instance" xmlns:pc="http://schemas.microsoft.com/office/infopath/2007/PartnerControls">
-  <documentManagement>
-    <TaxCatchAll xmlns="ef85bb3e-2804-46d3-905f-c22ca17669c2" xsi:nil="true"/>
-    <lcf76f155ced4ddcb4097134ff3c332f xmlns="28c133c1-f39f-47ef-88b0-6463f35cce5c">
-      <Terms xmlns="http://schemas.microsoft.com/office/infopath/2007/PartnerControls"/>
-    </lcf76f155ced4ddcb4097134ff3c332f>
-  </documentManagement>
-</p:properties>
-</file>
-
 <file path=customXml/item3.xml><?xml version="1.0" encoding="utf-8"?>
 <?mso-contentType ?>
 <FormTemplates xmlns="http://schemas.microsoft.com/sharepoint/v3/contenttype/forms">
@@ -12467,6 +14237,17 @@
 </file>
 
 <file path=customXml/itemProps1.xml><?xml version="1.0" encoding="utf-8"?>
+<ds:datastoreItem xmlns:ds="http://schemas.openxmlformats.org/officeDocument/2006/customXml" ds:itemID="{7D509F5C-F9A8-4B81-A34D-A19E99698530}">
+  <ds:schemaRefs>
+    <ds:schemaRef ds:uri="http://schemas.microsoft.com/office/2006/metadata/properties"/>
+    <ds:schemaRef ds:uri="http://schemas.microsoft.com/office/infopath/2007/PartnerControls"/>
+    <ds:schemaRef ds:uri="ef85bb3e-2804-46d3-905f-c22ca17669c2"/>
+    <ds:schemaRef ds:uri="28c133c1-f39f-47ef-88b0-6463f35cce5c"/>
+  </ds:schemaRefs>
+</ds:datastoreItem>
+</file>
+
+<file path=customXml/itemProps2.xml><?xml version="1.0" encoding="utf-8"?>
 <ds:datastoreItem xmlns:ds="http://schemas.openxmlformats.org/officeDocument/2006/customXml" ds:itemID="{3268C594-87E5-41E4-9CA5-CB38F2E29516}">
   <ds:schemaRefs>
     <ds:schemaRef ds:uri="http://schemas.microsoft.com/office/2006/metadata/contentType"/>
@@ -12485,17 +14266,6 @@
 </ds:datastoreItem>
 </file>
 
-<file path=customXml/itemProps2.xml><?xml version="1.0" encoding="utf-8"?>
-<ds:datastoreItem xmlns:ds="http://schemas.openxmlformats.org/officeDocument/2006/customXml" ds:itemID="{7D509F5C-F9A8-4B81-A34D-A19E99698530}">
-  <ds:schemaRefs>
-    <ds:schemaRef ds:uri="http://schemas.microsoft.com/office/2006/metadata/properties"/>
-    <ds:schemaRef ds:uri="http://schemas.microsoft.com/office/infopath/2007/PartnerControls"/>
-    <ds:schemaRef ds:uri="ef85bb3e-2804-46d3-905f-c22ca17669c2"/>
-    <ds:schemaRef ds:uri="28c133c1-f39f-47ef-88b0-6463f35cce5c"/>
-  </ds:schemaRefs>
-</ds:datastoreItem>
-</file>
-
 <file path=customXml/itemProps3.xml><?xml version="1.0" encoding="utf-8"?>
 <ds:datastoreItem xmlns:ds="http://schemas.openxmlformats.org/officeDocument/2006/customXml" ds:itemID="{91F9A68A-94B5-4F6C-9B07-087CE3814D9A}">
   <ds:schemaRefs>

</xml_diff>